<commit_message>
7. Function Expressions vs Function Declarations
</commit_message>
<xml_diff>
--- a/6. More on Functions/docs/Introduction.pptx
+++ b/6. More on Functions/docs/Introduction.pptx
@@ -8,12 +8,13 @@
     <p:sldId id="256" r:id="rId2"/>
     <p:sldId id="259" r:id="rId3"/>
     <p:sldId id="276" r:id="rId4"/>
-    <p:sldId id="270" r:id="rId5"/>
-    <p:sldId id="271" r:id="rId6"/>
-    <p:sldId id="272" r:id="rId7"/>
-    <p:sldId id="273" r:id="rId8"/>
-    <p:sldId id="274" r:id="rId9"/>
-    <p:sldId id="275" r:id="rId10"/>
+    <p:sldId id="277" r:id="rId5"/>
+    <p:sldId id="270" r:id="rId6"/>
+    <p:sldId id="271" r:id="rId7"/>
+    <p:sldId id="272" r:id="rId8"/>
+    <p:sldId id="273" r:id="rId9"/>
+    <p:sldId id="274" r:id="rId10"/>
+    <p:sldId id="275" r:id="rId11"/>
   </p:sldIdLst>
   <p:sldSz cx="12192000" cy="6858000"/>
   <p:notesSz cx="6858000" cy="9144000"/>
@@ -120,6 +121,7 @@
             <p14:sldId id="256"/>
             <p14:sldId id="259"/>
             <p14:sldId id="276"/>
+            <p14:sldId id="277"/>
             <p14:sldId id="270"/>
             <p14:sldId id="271"/>
             <p14:sldId id="272"/>
@@ -3244,6 +3246,983 @@
 </p:sld>
 </file>
 
+<file path=ppt/slides/slide10.xml><?xml version="1.0" encoding="utf-8"?>
+<p:sld xmlns:a="http://schemas.openxmlformats.org/drawingml/2006/main" xmlns:r="http://schemas.openxmlformats.org/officeDocument/2006/relationships" xmlns:p="http://schemas.openxmlformats.org/presentationml/2006/main">
+  <p:cSld>
+    <p:spTree>
+      <p:nvGrpSpPr>
+        <p:cNvPr id="1" name=""/>
+        <p:cNvGrpSpPr/>
+        <p:nvPr/>
+      </p:nvGrpSpPr>
+      <p:grpSpPr>
+        <a:xfrm>
+          <a:off x="0" y="0"/>
+          <a:ext cx="0" cy="0"/>
+          <a:chOff x="0" y="0"/>
+          <a:chExt cx="0" cy="0"/>
+        </a:xfrm>
+      </p:grpSpPr>
+      <p:sp>
+        <p:nvSpPr>
+          <p:cNvPr id="4" name="ZoneTexte 3"/>
+          <p:cNvSpPr txBox="1"/>
+          <p:nvPr/>
+        </p:nvSpPr>
+        <p:spPr>
+          <a:xfrm>
+            <a:off x="264329" y="0"/>
+            <a:ext cx="6007526" cy="523220"/>
+          </a:xfrm>
+          <a:prstGeom prst="rect">
+            <a:avLst/>
+          </a:prstGeom>
+          <a:noFill/>
+        </p:spPr>
+        <p:txBody>
+          <a:bodyPr wrap="square" rtlCol="0">
+            <a:spAutoFit/>
+          </a:bodyPr>
+          <a:lstStyle/>
+          <a:p>
+            <a:r>
+              <a:rPr lang="en-US" sz="2800" b="1" dirty="0" smtClean="0">
+                <a:ea typeface="Segoe UI Black" panose="020B0A02040204020203" pitchFamily="34" charset="0"/>
+                <a:cs typeface="Segoe UI Semibold" panose="020B0702040204020203" pitchFamily="34" charset="0"/>
+              </a:rPr>
+              <a:t>Garbage Collection</a:t>
+            </a:r>
+          </a:p>
+        </p:txBody>
+      </p:sp>
+      <p:sp>
+        <p:nvSpPr>
+          <p:cNvPr id="5" name="Rectangle 4"/>
+          <p:cNvSpPr/>
+          <p:nvPr/>
+        </p:nvSpPr>
+        <p:spPr>
+          <a:xfrm>
+            <a:off x="3268093" y="458311"/>
+            <a:ext cx="3638034" cy="692071"/>
+          </a:xfrm>
+          <a:prstGeom prst="rect">
+            <a:avLst/>
+          </a:prstGeom>
+          <a:solidFill>
+            <a:srgbClr val="FCF600"/>
+          </a:solidFill>
+          <a:ln w="28575">
+            <a:solidFill>
+              <a:schemeClr val="tx1"/>
+            </a:solidFill>
+          </a:ln>
+        </p:spPr>
+        <p:style>
+          <a:lnRef idx="2">
+            <a:schemeClr val="accent1">
+              <a:shade val="50000"/>
+            </a:schemeClr>
+          </a:lnRef>
+          <a:fillRef idx="1">
+            <a:schemeClr val="accent1"/>
+          </a:fillRef>
+          <a:effectRef idx="0">
+            <a:schemeClr val="accent1"/>
+          </a:effectRef>
+          <a:fontRef idx="minor">
+            <a:schemeClr val="lt1"/>
+          </a:fontRef>
+        </p:style>
+        <p:txBody>
+          <a:bodyPr rtlCol="0" anchor="ctr"/>
+          <a:lstStyle/>
+          <a:p>
+            <a:pPr algn="ctr"/>
+            <a:r>
+              <a:rPr lang="en-US" sz="2000" dirty="0" smtClean="0">
+                <a:solidFill>
+                  <a:sysClr val="windowText" lastClr="000000"/>
+                </a:solidFill>
+                <a:latin typeface="Calibri (Corps)"/>
+                <a:cs typeface="Segoe UI Light" panose="020B0502040204020203" pitchFamily="34" charset="0"/>
+              </a:rPr>
+              <a:t>How is this memory managed?</a:t>
+            </a:r>
+            <a:endParaRPr lang="en-US" sz="2000" dirty="0">
+              <a:solidFill>
+                <a:sysClr val="windowText" lastClr="000000"/>
+              </a:solidFill>
+              <a:latin typeface="Calibri (Corps)"/>
+              <a:cs typeface="Segoe UI Light" panose="020B0502040204020203" pitchFamily="34" charset="0"/>
+            </a:endParaRPr>
+          </a:p>
+        </p:txBody>
+      </p:sp>
+      <p:grpSp>
+        <p:nvGrpSpPr>
+          <p:cNvPr id="6" name="Groupe 5"/>
+          <p:cNvGrpSpPr/>
+          <p:nvPr/>
+        </p:nvGrpSpPr>
+        <p:grpSpPr>
+          <a:xfrm>
+            <a:off x="1324993" y="2680798"/>
+            <a:ext cx="3621504" cy="3584439"/>
+            <a:chOff x="1780673" y="2805049"/>
+            <a:chExt cx="3621504" cy="3584439"/>
+          </a:xfrm>
+        </p:grpSpPr>
+        <p:sp>
+          <p:nvSpPr>
+            <p:cNvPr id="7" name="Rectangle 6"/>
+            <p:cNvSpPr/>
+            <p:nvPr/>
+          </p:nvSpPr>
+          <p:spPr>
+            <a:xfrm>
+              <a:off x="1780673" y="2805049"/>
+              <a:ext cx="3621504" cy="2723856"/>
+            </a:xfrm>
+            <a:prstGeom prst="rect">
+              <a:avLst/>
+            </a:prstGeom>
+            <a:solidFill>
+              <a:srgbClr val="ED7D31">
+                <a:alpha val="29020"/>
+              </a:srgbClr>
+            </a:solidFill>
+            <a:ln w="28575">
+              <a:solidFill>
+                <a:schemeClr val="accent2">
+                  <a:lumMod val="60000"/>
+                  <a:lumOff val="40000"/>
+                </a:schemeClr>
+              </a:solidFill>
+            </a:ln>
+          </p:spPr>
+          <p:style>
+            <a:lnRef idx="2">
+              <a:schemeClr val="accent2"/>
+            </a:lnRef>
+            <a:fillRef idx="1">
+              <a:schemeClr val="lt1"/>
+            </a:fillRef>
+            <a:effectRef idx="0">
+              <a:schemeClr val="accent2"/>
+            </a:effectRef>
+            <a:fontRef idx="minor">
+              <a:schemeClr val="dk1"/>
+            </a:fontRef>
+          </p:style>
+          <p:txBody>
+            <a:bodyPr rtlCol="0" anchor="ctr"/>
+            <a:lstStyle/>
+            <a:p>
+              <a:pPr algn="ctr"/>
+              <a:endParaRPr lang="en-US" sz="2400" dirty="0">
+                <a:solidFill>
+                  <a:schemeClr val="accent2"/>
+                </a:solidFill>
+              </a:endParaRPr>
+            </a:p>
+          </p:txBody>
+        </p:sp>
+        <p:sp>
+          <p:nvSpPr>
+            <p:cNvPr id="8" name="Rectangle 7"/>
+            <p:cNvSpPr/>
+            <p:nvPr/>
+          </p:nvSpPr>
+          <p:spPr>
+            <a:xfrm>
+              <a:off x="1780673" y="5528905"/>
+              <a:ext cx="3621504" cy="860583"/>
+            </a:xfrm>
+            <a:prstGeom prst="rect">
+              <a:avLst/>
+            </a:prstGeom>
+            <a:solidFill>
+              <a:schemeClr val="accent2">
+                <a:lumMod val="60000"/>
+                <a:lumOff val="40000"/>
+              </a:schemeClr>
+            </a:solidFill>
+            <a:ln w="19050">
+              <a:solidFill>
+                <a:schemeClr val="accent2">
+                  <a:lumMod val="60000"/>
+                  <a:lumOff val="40000"/>
+                </a:schemeClr>
+              </a:solidFill>
+            </a:ln>
+          </p:spPr>
+          <p:style>
+            <a:lnRef idx="2">
+              <a:schemeClr val="accent1">
+                <a:shade val="50000"/>
+              </a:schemeClr>
+            </a:lnRef>
+            <a:fillRef idx="1">
+              <a:schemeClr val="accent1"/>
+            </a:fillRef>
+            <a:effectRef idx="0">
+              <a:schemeClr val="accent1"/>
+            </a:effectRef>
+            <a:fontRef idx="minor">
+              <a:schemeClr val="lt1"/>
+            </a:fontRef>
+          </p:style>
+          <p:txBody>
+            <a:bodyPr rtlCol="0" anchor="ctr"/>
+            <a:lstStyle/>
+            <a:p>
+              <a:pPr algn="ctr"/>
+              <a:r>
+                <a:rPr lang="en-US" sz="2000" dirty="0" smtClean="0">
+                  <a:latin typeface="Calibri (Corps)"/>
+                  <a:cs typeface="Segoe UI Light" panose="020B0502040204020203" pitchFamily="34" charset="0"/>
+                </a:rPr>
+                <a:t>Heap</a:t>
+              </a:r>
+              <a:endParaRPr lang="en-US" sz="2000" dirty="0">
+                <a:latin typeface="Calibri (Corps)"/>
+                <a:cs typeface="Segoe UI Light" panose="020B0502040204020203" pitchFamily="34" charset="0"/>
+              </a:endParaRPr>
+            </a:p>
+          </p:txBody>
+        </p:sp>
+        <p:sp>
+          <p:nvSpPr>
+            <p:cNvPr id="9" name="Rectangle 8"/>
+            <p:cNvSpPr/>
+            <p:nvPr/>
+          </p:nvSpPr>
+          <p:spPr>
+            <a:xfrm>
+              <a:off x="2056613" y="2986747"/>
+              <a:ext cx="785456" cy="736323"/>
+            </a:xfrm>
+            <a:prstGeom prst="rect">
+              <a:avLst/>
+            </a:prstGeom>
+            <a:solidFill>
+              <a:schemeClr val="accent2">
+                <a:lumMod val="60000"/>
+                <a:lumOff val="40000"/>
+              </a:schemeClr>
+            </a:solidFill>
+            <a:ln w="19050">
+              <a:noFill/>
+            </a:ln>
+          </p:spPr>
+          <p:style>
+            <a:lnRef idx="2">
+              <a:schemeClr val="accent1">
+                <a:shade val="50000"/>
+              </a:schemeClr>
+            </a:lnRef>
+            <a:fillRef idx="1">
+              <a:schemeClr val="accent1"/>
+            </a:fillRef>
+            <a:effectRef idx="0">
+              <a:schemeClr val="accent1"/>
+            </a:effectRef>
+            <a:fontRef idx="minor">
+              <a:schemeClr val="lt1"/>
+            </a:fontRef>
+          </p:style>
+          <p:txBody>
+            <a:bodyPr rtlCol="0" anchor="ctr"/>
+            <a:lstStyle/>
+            <a:p>
+              <a:pPr algn="ctr"/>
+              <a:r>
+                <a:rPr lang="en-US" sz="2000" dirty="0" smtClean="0">
+                  <a:latin typeface="Calibri (Corps)"/>
+                  <a:cs typeface="Segoe UI Light" panose="020B0502040204020203" pitchFamily="34" charset="0"/>
+                </a:rPr>
+                <a:t>A</a:t>
+              </a:r>
+              <a:endParaRPr lang="en-US" sz="2000" dirty="0">
+                <a:latin typeface="Calibri (Corps)"/>
+                <a:cs typeface="Segoe UI Light" panose="020B0502040204020203" pitchFamily="34" charset="0"/>
+              </a:endParaRPr>
+            </a:p>
+          </p:txBody>
+        </p:sp>
+        <p:sp>
+          <p:nvSpPr>
+            <p:cNvPr id="10" name="Rectangle 9"/>
+            <p:cNvSpPr/>
+            <p:nvPr/>
+          </p:nvSpPr>
+          <p:spPr>
+            <a:xfrm>
+              <a:off x="3288942" y="3723070"/>
+              <a:ext cx="785456" cy="736323"/>
+            </a:xfrm>
+            <a:prstGeom prst="rect">
+              <a:avLst/>
+            </a:prstGeom>
+            <a:solidFill>
+              <a:schemeClr val="accent2">
+                <a:lumMod val="60000"/>
+                <a:lumOff val="40000"/>
+              </a:schemeClr>
+            </a:solidFill>
+            <a:ln w="19050">
+              <a:noFill/>
+            </a:ln>
+          </p:spPr>
+          <p:style>
+            <a:lnRef idx="2">
+              <a:schemeClr val="accent1">
+                <a:shade val="50000"/>
+              </a:schemeClr>
+            </a:lnRef>
+            <a:fillRef idx="1">
+              <a:schemeClr val="accent1"/>
+            </a:fillRef>
+            <a:effectRef idx="0">
+              <a:schemeClr val="accent1"/>
+            </a:effectRef>
+            <a:fontRef idx="minor">
+              <a:schemeClr val="lt1"/>
+            </a:fontRef>
+          </p:style>
+          <p:txBody>
+            <a:bodyPr rtlCol="0" anchor="ctr"/>
+            <a:lstStyle/>
+            <a:p>
+              <a:pPr algn="ctr"/>
+              <a:r>
+                <a:rPr lang="en-US" sz="2000" dirty="0" smtClean="0">
+                  <a:latin typeface="Calibri (Corps)"/>
+                  <a:cs typeface="Segoe UI Light" panose="020B0502040204020203" pitchFamily="34" charset="0"/>
+                </a:rPr>
+                <a:t>B</a:t>
+              </a:r>
+              <a:endParaRPr lang="en-US" sz="2000" dirty="0">
+                <a:latin typeface="Calibri (Corps)"/>
+                <a:cs typeface="Segoe UI Light" panose="020B0502040204020203" pitchFamily="34" charset="0"/>
+              </a:endParaRPr>
+            </a:p>
+          </p:txBody>
+        </p:sp>
+        <p:sp>
+          <p:nvSpPr>
+            <p:cNvPr id="11" name="Rectangle 10"/>
+            <p:cNvSpPr/>
+            <p:nvPr/>
+          </p:nvSpPr>
+          <p:spPr>
+            <a:xfrm>
+              <a:off x="2318330" y="4625988"/>
+              <a:ext cx="785456" cy="736323"/>
+            </a:xfrm>
+            <a:prstGeom prst="rect">
+              <a:avLst/>
+            </a:prstGeom>
+            <a:solidFill>
+              <a:schemeClr val="accent2">
+                <a:lumMod val="60000"/>
+                <a:lumOff val="40000"/>
+              </a:schemeClr>
+            </a:solidFill>
+            <a:ln w="19050">
+              <a:noFill/>
+            </a:ln>
+          </p:spPr>
+          <p:style>
+            <a:lnRef idx="2">
+              <a:schemeClr val="accent1">
+                <a:shade val="50000"/>
+              </a:schemeClr>
+            </a:lnRef>
+            <a:fillRef idx="1">
+              <a:schemeClr val="accent1"/>
+            </a:fillRef>
+            <a:effectRef idx="0">
+              <a:schemeClr val="accent1"/>
+            </a:effectRef>
+            <a:fontRef idx="minor">
+              <a:schemeClr val="lt1"/>
+            </a:fontRef>
+          </p:style>
+          <p:txBody>
+            <a:bodyPr rtlCol="0" anchor="ctr"/>
+            <a:lstStyle/>
+            <a:p>
+              <a:pPr algn="ctr"/>
+              <a:r>
+                <a:rPr lang="en-US" sz="2000" dirty="0" smtClean="0">
+                  <a:latin typeface="Calibri (Corps)"/>
+                  <a:cs typeface="Segoe UI Light" panose="020B0502040204020203" pitchFamily="34" charset="0"/>
+                </a:rPr>
+                <a:t>C</a:t>
+              </a:r>
+              <a:endParaRPr lang="en-US" sz="2000" dirty="0">
+                <a:latin typeface="Calibri (Corps)"/>
+                <a:cs typeface="Segoe UI Light" panose="020B0502040204020203" pitchFamily="34" charset="0"/>
+              </a:endParaRPr>
+            </a:p>
+          </p:txBody>
+        </p:sp>
+        <p:sp>
+          <p:nvSpPr>
+            <p:cNvPr id="12" name="Rectangle 11"/>
+            <p:cNvSpPr/>
+            <p:nvPr/>
+          </p:nvSpPr>
+          <p:spPr>
+            <a:xfrm>
+              <a:off x="4397278" y="4386628"/>
+              <a:ext cx="785456" cy="736323"/>
+            </a:xfrm>
+            <a:prstGeom prst="rect">
+              <a:avLst/>
+            </a:prstGeom>
+            <a:solidFill>
+              <a:schemeClr val="accent2">
+                <a:lumMod val="60000"/>
+                <a:lumOff val="40000"/>
+              </a:schemeClr>
+            </a:solidFill>
+            <a:ln w="19050">
+              <a:noFill/>
+            </a:ln>
+          </p:spPr>
+          <p:style>
+            <a:lnRef idx="2">
+              <a:schemeClr val="accent1">
+                <a:shade val="50000"/>
+              </a:schemeClr>
+            </a:lnRef>
+            <a:fillRef idx="1">
+              <a:schemeClr val="accent1"/>
+            </a:fillRef>
+            <a:effectRef idx="0">
+              <a:schemeClr val="accent1"/>
+            </a:effectRef>
+            <a:fontRef idx="minor">
+              <a:schemeClr val="lt1"/>
+            </a:fontRef>
+          </p:style>
+          <p:txBody>
+            <a:bodyPr rtlCol="0" anchor="ctr"/>
+            <a:lstStyle/>
+            <a:p>
+              <a:pPr algn="ctr"/>
+              <a:r>
+                <a:rPr lang="en-US" sz="2000" dirty="0" smtClean="0">
+                  <a:latin typeface="Calibri (Corps)"/>
+                  <a:cs typeface="Segoe UI Light" panose="020B0502040204020203" pitchFamily="34" charset="0"/>
+                </a:rPr>
+                <a:t>D</a:t>
+              </a:r>
+              <a:endParaRPr lang="en-US" sz="2000" dirty="0">
+                <a:latin typeface="Calibri (Corps)"/>
+                <a:cs typeface="Segoe UI Light" panose="020B0502040204020203" pitchFamily="34" charset="0"/>
+              </a:endParaRPr>
+            </a:p>
+          </p:txBody>
+        </p:sp>
+      </p:grpSp>
+      <p:sp>
+        <p:nvSpPr>
+          <p:cNvPr id="13" name="Flèche droite 12"/>
+          <p:cNvSpPr/>
+          <p:nvPr/>
+        </p:nvSpPr>
+        <p:spPr>
+          <a:xfrm rot="6646972">
+            <a:off x="3049141" y="1675046"/>
+            <a:ext cx="1457067" cy="746614"/>
+          </a:xfrm>
+          <a:prstGeom prst="rightArrow">
+            <a:avLst/>
+          </a:prstGeom>
+          <a:solidFill>
+            <a:srgbClr val="FCF600"/>
+          </a:solidFill>
+          <a:ln w="28575">
+            <a:solidFill>
+              <a:schemeClr val="tx1"/>
+            </a:solidFill>
+          </a:ln>
+        </p:spPr>
+        <p:style>
+          <a:lnRef idx="2">
+            <a:schemeClr val="accent1">
+              <a:shade val="50000"/>
+            </a:schemeClr>
+          </a:lnRef>
+          <a:fillRef idx="1">
+            <a:schemeClr val="accent1"/>
+          </a:fillRef>
+          <a:effectRef idx="0">
+            <a:schemeClr val="accent1"/>
+          </a:effectRef>
+          <a:fontRef idx="minor">
+            <a:schemeClr val="lt1"/>
+          </a:fontRef>
+        </p:style>
+        <p:txBody>
+          <a:bodyPr rtlCol="0" anchor="ctr"/>
+          <a:lstStyle/>
+          <a:p>
+            <a:pPr algn="ctr"/>
+            <a:endParaRPr lang="en-US" sz="2000" dirty="0">
+              <a:solidFill>
+                <a:sysClr val="windowText" lastClr="000000"/>
+              </a:solidFill>
+              <a:latin typeface="Calibri (Corps)"/>
+              <a:cs typeface="Segoe UI Light" panose="020B0502040204020203" pitchFamily="34" charset="0"/>
+            </a:endParaRPr>
+          </a:p>
+        </p:txBody>
+      </p:sp>
+      <p:sp>
+        <p:nvSpPr>
+          <p:cNvPr id="14" name="Rectangle 13"/>
+          <p:cNvSpPr/>
+          <p:nvPr/>
+        </p:nvSpPr>
+        <p:spPr>
+          <a:xfrm>
+            <a:off x="6906127" y="2680798"/>
+            <a:ext cx="4041882" cy="651949"/>
+          </a:xfrm>
+          <a:prstGeom prst="rect">
+            <a:avLst/>
+          </a:prstGeom>
+          <a:solidFill>
+            <a:srgbClr val="660066"/>
+          </a:solidFill>
+          <a:ln>
+            <a:noFill/>
+          </a:ln>
+        </p:spPr>
+        <p:style>
+          <a:lnRef idx="2">
+            <a:schemeClr val="accent1">
+              <a:shade val="50000"/>
+            </a:schemeClr>
+          </a:lnRef>
+          <a:fillRef idx="1">
+            <a:schemeClr val="accent1"/>
+          </a:fillRef>
+          <a:effectRef idx="0">
+            <a:schemeClr val="accent1"/>
+          </a:effectRef>
+          <a:fontRef idx="minor">
+            <a:schemeClr val="lt1"/>
+          </a:fontRef>
+        </p:style>
+        <p:txBody>
+          <a:bodyPr rtlCol="0" anchor="ctr"/>
+          <a:lstStyle/>
+          <a:p>
+            <a:pPr algn="ctr"/>
+            <a:r>
+              <a:rPr lang="en-US" sz="2000" b="1" dirty="0" smtClean="0">
+                <a:latin typeface="Calibri (Corps)"/>
+                <a:cs typeface="Segoe UI Light" panose="020B0502040204020203" pitchFamily="34" charset="0"/>
+              </a:rPr>
+              <a:t>(V8’s) Garbage Collector</a:t>
+            </a:r>
+            <a:endParaRPr lang="en-US" sz="2000" b="1" dirty="0">
+              <a:latin typeface="Calibri (Corps)"/>
+              <a:cs typeface="Segoe UI Light" panose="020B0502040204020203" pitchFamily="34" charset="0"/>
+            </a:endParaRPr>
+          </a:p>
+        </p:txBody>
+      </p:sp>
+      <p:sp>
+        <p:nvSpPr>
+          <p:cNvPr id="15" name="Rectangle 14"/>
+          <p:cNvSpPr/>
+          <p:nvPr/>
+        </p:nvSpPr>
+        <p:spPr>
+          <a:xfrm>
+            <a:off x="6906127" y="3447204"/>
+            <a:ext cx="4041882" cy="1790856"/>
+          </a:xfrm>
+          <a:prstGeom prst="rect">
+            <a:avLst/>
+          </a:prstGeom>
+          <a:solidFill>
+            <a:srgbClr val="CC3399">
+              <a:alpha val="29020"/>
+            </a:srgbClr>
+          </a:solidFill>
+          <a:ln w="28575">
+            <a:solidFill>
+              <a:srgbClr val="660066"/>
+            </a:solidFill>
+          </a:ln>
+        </p:spPr>
+        <p:style>
+          <a:lnRef idx="2">
+            <a:schemeClr val="accent1">
+              <a:shade val="50000"/>
+            </a:schemeClr>
+          </a:lnRef>
+          <a:fillRef idx="1">
+            <a:schemeClr val="accent1"/>
+          </a:fillRef>
+          <a:effectRef idx="0">
+            <a:schemeClr val="accent1"/>
+          </a:effectRef>
+          <a:fontRef idx="minor">
+            <a:schemeClr val="lt1"/>
+          </a:fontRef>
+        </p:style>
+        <p:txBody>
+          <a:bodyPr rtlCol="0" anchor="ctr"/>
+          <a:lstStyle/>
+          <a:p>
+            <a:pPr algn="ctr"/>
+            <a:r>
+              <a:rPr lang="en-US" sz="2000" dirty="0" smtClean="0">
+                <a:solidFill>
+                  <a:srgbClr val="660066"/>
+                </a:solidFill>
+                <a:latin typeface="Calibri (Corps)"/>
+                <a:cs typeface="Segoe UI Light" panose="020B0502040204020203" pitchFamily="34" charset="0"/>
+              </a:rPr>
+              <a:t>Periodically checks Heap for unused objects (objects without references)</a:t>
+            </a:r>
+            <a:endParaRPr lang="en-US" sz="2000" dirty="0">
+              <a:solidFill>
+                <a:srgbClr val="660066"/>
+              </a:solidFill>
+              <a:latin typeface="Calibri (Corps)"/>
+              <a:cs typeface="Segoe UI Light" panose="020B0502040204020203" pitchFamily="34" charset="0"/>
+            </a:endParaRPr>
+          </a:p>
+        </p:txBody>
+      </p:sp>
+      <p:sp>
+        <p:nvSpPr>
+          <p:cNvPr id="16" name="Rectangle 15"/>
+          <p:cNvSpPr/>
+          <p:nvPr/>
+        </p:nvSpPr>
+        <p:spPr>
+          <a:xfrm>
+            <a:off x="6906127" y="5425982"/>
+            <a:ext cx="4041882" cy="839255"/>
+          </a:xfrm>
+          <a:prstGeom prst="rect">
+            <a:avLst/>
+          </a:prstGeom>
+          <a:solidFill>
+            <a:srgbClr val="CC3399">
+              <a:alpha val="29020"/>
+            </a:srgbClr>
+          </a:solidFill>
+          <a:ln w="28575">
+            <a:solidFill>
+              <a:srgbClr val="660066"/>
+            </a:solidFill>
+          </a:ln>
+        </p:spPr>
+        <p:style>
+          <a:lnRef idx="2">
+            <a:schemeClr val="accent1">
+              <a:shade val="50000"/>
+            </a:schemeClr>
+          </a:lnRef>
+          <a:fillRef idx="1">
+            <a:schemeClr val="accent1"/>
+          </a:fillRef>
+          <a:effectRef idx="0">
+            <a:schemeClr val="accent1"/>
+          </a:effectRef>
+          <a:fontRef idx="minor">
+            <a:schemeClr val="lt1"/>
+          </a:fontRef>
+        </p:style>
+        <p:txBody>
+          <a:bodyPr rtlCol="0" anchor="ctr"/>
+          <a:lstStyle/>
+          <a:p>
+            <a:pPr algn="ctr"/>
+            <a:r>
+              <a:rPr lang="en-US" sz="2000" dirty="0" smtClean="0">
+                <a:solidFill>
+                  <a:srgbClr val="660066"/>
+                </a:solidFill>
+                <a:latin typeface="Calibri (Corps)"/>
+                <a:cs typeface="Segoe UI Light" panose="020B0502040204020203" pitchFamily="34" charset="0"/>
+              </a:rPr>
+              <a:t>Removes unused objects</a:t>
+            </a:r>
+            <a:endParaRPr lang="en-US" sz="2000" dirty="0">
+              <a:solidFill>
+                <a:srgbClr val="660066"/>
+              </a:solidFill>
+              <a:latin typeface="Calibri (Corps)"/>
+              <a:cs typeface="Segoe UI Light" panose="020B0502040204020203" pitchFamily="34" charset="0"/>
+            </a:endParaRPr>
+          </a:p>
+        </p:txBody>
+      </p:sp>
+      <p:sp>
+        <p:nvSpPr>
+          <p:cNvPr id="17" name="Flèche droite 16"/>
+          <p:cNvSpPr/>
+          <p:nvPr/>
+        </p:nvSpPr>
+        <p:spPr>
+          <a:xfrm rot="10800000">
+            <a:off x="5125434" y="3609231"/>
+            <a:ext cx="1601755" cy="733401"/>
+          </a:xfrm>
+          <a:prstGeom prst="rightArrow">
+            <a:avLst/>
+          </a:prstGeom>
+          <a:solidFill>
+            <a:schemeClr val="accent2"/>
+          </a:solidFill>
+          <a:ln w="28575">
+            <a:solidFill>
+              <a:schemeClr val="tx1"/>
+            </a:solidFill>
+          </a:ln>
+        </p:spPr>
+        <p:style>
+          <a:lnRef idx="2">
+            <a:schemeClr val="accent1">
+              <a:shade val="50000"/>
+            </a:schemeClr>
+          </a:lnRef>
+          <a:fillRef idx="1">
+            <a:schemeClr val="accent1"/>
+          </a:fillRef>
+          <a:effectRef idx="0">
+            <a:schemeClr val="accent1"/>
+          </a:effectRef>
+          <a:fontRef idx="minor">
+            <a:schemeClr val="lt1"/>
+          </a:fontRef>
+        </p:style>
+        <p:txBody>
+          <a:bodyPr rtlCol="0" anchor="ctr"/>
+          <a:lstStyle/>
+          <a:p>
+            <a:pPr algn="ctr"/>
+            <a:endParaRPr lang="en-US" sz="2000" dirty="0">
+              <a:solidFill>
+                <a:sysClr val="windowText" lastClr="000000"/>
+              </a:solidFill>
+              <a:latin typeface="Calibri (Corps)"/>
+              <a:cs typeface="Segoe UI Light" panose="020B0502040204020203" pitchFamily="34" charset="0"/>
+            </a:endParaRPr>
+          </a:p>
+        </p:txBody>
+      </p:sp>
+      <p:sp>
+        <p:nvSpPr>
+          <p:cNvPr id="18" name="Flèche droite 17"/>
+          <p:cNvSpPr/>
+          <p:nvPr/>
+        </p:nvSpPr>
+        <p:spPr>
+          <a:xfrm>
+            <a:off x="5125434" y="4504659"/>
+            <a:ext cx="1601755" cy="733401"/>
+          </a:xfrm>
+          <a:prstGeom prst="rightArrow">
+            <a:avLst/>
+          </a:prstGeom>
+          <a:solidFill>
+            <a:schemeClr val="accent2"/>
+          </a:solidFill>
+          <a:ln w="28575">
+            <a:solidFill>
+              <a:schemeClr val="tx1"/>
+            </a:solidFill>
+          </a:ln>
+        </p:spPr>
+        <p:style>
+          <a:lnRef idx="2">
+            <a:schemeClr val="accent1">
+              <a:shade val="50000"/>
+            </a:schemeClr>
+          </a:lnRef>
+          <a:fillRef idx="1">
+            <a:schemeClr val="accent1"/>
+          </a:fillRef>
+          <a:effectRef idx="0">
+            <a:schemeClr val="accent1"/>
+          </a:effectRef>
+          <a:fontRef idx="minor">
+            <a:schemeClr val="lt1"/>
+          </a:fontRef>
+        </p:style>
+        <p:txBody>
+          <a:bodyPr rtlCol="0" anchor="ctr"/>
+          <a:lstStyle/>
+          <a:p>
+            <a:pPr algn="ctr"/>
+            <a:endParaRPr lang="en-US" sz="2000" dirty="0">
+              <a:solidFill>
+                <a:sysClr val="windowText" lastClr="000000"/>
+              </a:solidFill>
+              <a:latin typeface="Calibri (Corps)"/>
+              <a:cs typeface="Segoe UI Light" panose="020B0502040204020203" pitchFamily="34" charset="0"/>
+            </a:endParaRPr>
+          </a:p>
+        </p:txBody>
+      </p:sp>
+      <p:sp>
+        <p:nvSpPr>
+          <p:cNvPr id="19" name="Flèche droite 18"/>
+          <p:cNvSpPr/>
+          <p:nvPr/>
+        </p:nvSpPr>
+        <p:spPr>
+          <a:xfrm rot="10800000">
+            <a:off x="5087110" y="5425982"/>
+            <a:ext cx="1601755" cy="733401"/>
+          </a:xfrm>
+          <a:prstGeom prst="rightArrow">
+            <a:avLst/>
+          </a:prstGeom>
+          <a:solidFill>
+            <a:schemeClr val="accent2"/>
+          </a:solidFill>
+          <a:ln w="28575">
+            <a:solidFill>
+              <a:schemeClr val="tx1"/>
+            </a:solidFill>
+          </a:ln>
+        </p:spPr>
+        <p:style>
+          <a:lnRef idx="2">
+            <a:schemeClr val="accent1">
+              <a:shade val="50000"/>
+            </a:schemeClr>
+          </a:lnRef>
+          <a:fillRef idx="1">
+            <a:schemeClr val="accent1"/>
+          </a:fillRef>
+          <a:effectRef idx="0">
+            <a:schemeClr val="accent1"/>
+          </a:effectRef>
+          <a:fontRef idx="minor">
+            <a:schemeClr val="lt1"/>
+          </a:fontRef>
+        </p:style>
+        <p:txBody>
+          <a:bodyPr rtlCol="0" anchor="ctr"/>
+          <a:lstStyle/>
+          <a:p>
+            <a:pPr algn="ctr"/>
+            <a:endParaRPr lang="en-US" sz="2000" dirty="0">
+              <a:solidFill>
+                <a:sysClr val="windowText" lastClr="000000"/>
+              </a:solidFill>
+              <a:latin typeface="Calibri (Corps)"/>
+              <a:cs typeface="Segoe UI Light" panose="020B0502040204020203" pitchFamily="34" charset="0"/>
+            </a:endParaRPr>
+          </a:p>
+        </p:txBody>
+      </p:sp>
+      <p:sp>
+        <p:nvSpPr>
+          <p:cNvPr id="20" name="Rectangle 19"/>
+          <p:cNvSpPr/>
+          <p:nvPr/>
+        </p:nvSpPr>
+        <p:spPr>
+          <a:xfrm>
+            <a:off x="8245157" y="1295894"/>
+            <a:ext cx="3638034" cy="1239390"/>
+          </a:xfrm>
+          <a:prstGeom prst="rect">
+            <a:avLst/>
+          </a:prstGeom>
+          <a:solidFill>
+            <a:srgbClr val="FCF600"/>
+          </a:solidFill>
+          <a:ln w="28575">
+            <a:solidFill>
+              <a:schemeClr val="tx1"/>
+            </a:solidFill>
+          </a:ln>
+        </p:spPr>
+        <p:style>
+          <a:lnRef idx="2">
+            <a:schemeClr val="accent1">
+              <a:shade val="50000"/>
+            </a:schemeClr>
+          </a:lnRef>
+          <a:fillRef idx="1">
+            <a:schemeClr val="accent1"/>
+          </a:fillRef>
+          <a:effectRef idx="0">
+            <a:schemeClr val="accent1"/>
+          </a:effectRef>
+          <a:fontRef idx="minor">
+            <a:schemeClr val="lt1"/>
+          </a:fontRef>
+        </p:style>
+        <p:txBody>
+          <a:bodyPr rtlCol="0" anchor="ctr"/>
+          <a:lstStyle/>
+          <a:p>
+            <a:pPr algn="ctr"/>
+            <a:r>
+              <a:rPr lang="en-US" sz="2000" dirty="0" smtClean="0">
+                <a:solidFill>
+                  <a:sysClr val="windowText" lastClr="000000"/>
+                </a:solidFill>
+                <a:latin typeface="Calibri (Corps)"/>
+                <a:cs typeface="Segoe UI Light" panose="020B0502040204020203" pitchFamily="34" charset="0"/>
+              </a:rPr>
+              <a:t>Beware of “Memory Leaks”:</a:t>
+            </a:r>
+          </a:p>
+          <a:p>
+            <a:pPr algn="ctr"/>
+            <a:r>
+              <a:rPr lang="en-US" sz="2000" dirty="0" smtClean="0">
+                <a:solidFill>
+                  <a:sysClr val="windowText" lastClr="000000"/>
+                </a:solidFill>
+                <a:latin typeface="Calibri (Corps)"/>
+                <a:cs typeface="Segoe UI Light" panose="020B0502040204020203" pitchFamily="34" charset="0"/>
+              </a:rPr>
+              <a:t>Unused objects, where you still hold references to</a:t>
+            </a:r>
+            <a:endParaRPr lang="en-US" sz="2000" dirty="0">
+              <a:solidFill>
+                <a:sysClr val="windowText" lastClr="000000"/>
+              </a:solidFill>
+              <a:latin typeface="Calibri (Corps)"/>
+              <a:cs typeface="Segoe UI Light" panose="020B0502040204020203" pitchFamily="34" charset="0"/>
+            </a:endParaRPr>
+          </a:p>
+        </p:txBody>
+      </p:sp>
+    </p:spTree>
+    <p:extLst>
+      <p:ext uri="{BB962C8B-B14F-4D97-AF65-F5344CB8AC3E}">
+        <p14:creationId xmlns:p14="http://schemas.microsoft.com/office/powerpoint/2010/main" val="1522621142"/>
+      </p:ext>
+    </p:extLst>
+  </p:cSld>
+  <p:clrMapOvr>
+    <a:masterClrMapping/>
+  </p:clrMapOvr>
+</p:sld>
+</file>
+
 <file path=ppt/slides/slide2.xml><?xml version="1.0" encoding="utf-8"?>
 <p:sld xmlns:a="http://schemas.openxmlformats.org/drawingml/2006/main" xmlns:r="http://schemas.openxmlformats.org/officeDocument/2006/relationships" xmlns:p="http://schemas.openxmlformats.org/presentationml/2006/main">
   <p:cSld>
@@ -3976,57 +4955,25 @@
                 <a:ea typeface="Segoe UI Black" panose="020B0A02040204020203" pitchFamily="34" charset="0"/>
                 <a:cs typeface="Segoe UI Semibold" panose="020B0702040204020203" pitchFamily="34" charset="0"/>
               </a:rPr>
-              <a:t>ES5 vs ES6</a:t>
-            </a:r>
-          </a:p>
-        </p:txBody>
-      </p:sp>
-      <p:cxnSp>
-        <p:nvCxnSpPr>
-          <p:cNvPr id="7" name="Connecteur droit 6"/>
-          <p:cNvCxnSpPr/>
-          <p:nvPr/>
-        </p:nvCxnSpPr>
-        <p:spPr>
-          <a:xfrm>
-            <a:off x="5999898" y="193964"/>
-            <a:ext cx="12032" cy="6279025"/>
-          </a:xfrm>
-          <a:prstGeom prst="line">
-            <a:avLst/>
-          </a:prstGeom>
-          <a:ln w="76200">
-            <a:solidFill>
-              <a:srgbClr val="CC3399"/>
-            </a:solidFill>
-            <a:prstDash val="dash"/>
-          </a:ln>
-        </p:spPr>
-        <p:style>
-          <a:lnRef idx="1">
-            <a:schemeClr val="accent1"/>
-          </a:lnRef>
-          <a:fillRef idx="0">
-            <a:schemeClr val="accent1"/>
-          </a:fillRef>
-          <a:effectRef idx="0">
-            <a:schemeClr val="accent1"/>
-          </a:effectRef>
-          <a:fontRef idx="minor">
-            <a:schemeClr val="tx1"/>
-          </a:fontRef>
-        </p:style>
-      </p:cxnSp>
-      <p:sp>
-        <p:nvSpPr>
-          <p:cNvPr id="9" name="Rectangle 8"/>
+              <a:t>A Different Way of Defining Functions</a:t>
+            </a:r>
+            <a:endParaRPr lang="en-US" sz="2800" b="1" dirty="0" smtClean="0">
+              <a:ea typeface="Segoe UI Black" panose="020B0A02040204020203" pitchFamily="34" charset="0"/>
+              <a:cs typeface="Segoe UI Semibold" panose="020B0702040204020203" pitchFamily="34" charset="0"/>
+            </a:endParaRPr>
+          </a:p>
+        </p:txBody>
+      </p:sp>
+      <p:sp>
+        <p:nvSpPr>
+          <p:cNvPr id="5" name="Rectangle 4"/>
           <p:cNvSpPr/>
           <p:nvPr/>
         </p:nvSpPr>
         <p:spPr>
           <a:xfrm>
-            <a:off x="76503" y="2282221"/>
-            <a:ext cx="5694704" cy="624329"/>
+            <a:off x="489527" y="1118938"/>
+            <a:ext cx="5538294" cy="733925"/>
           </a:xfrm>
           <a:prstGeom prst="rect">
             <a:avLst/>
@@ -4060,13 +5007,13 @@
           <a:p>
             <a:pPr algn="ctr"/>
             <a:r>
-              <a:rPr lang="en-US" sz="2400" b="1" dirty="0" smtClean="0">
+              <a:rPr lang="en-US" sz="2000" b="1" dirty="0" smtClean="0">
                 <a:latin typeface="Calibri (Corps)"/>
                 <a:cs typeface="Segoe UI Light" panose="020B0502040204020203" pitchFamily="34" charset="0"/>
               </a:rPr>
-              <a:t>ES5 (and older)</a:t>
-            </a:r>
-            <a:endParaRPr lang="en-US" sz="2400" b="1" dirty="0">
+              <a:t>Functions Declaration / Function Statement</a:t>
+            </a:r>
+            <a:endParaRPr lang="en-US" sz="2000" b="1" dirty="0">
               <a:latin typeface="Calibri (Corps)"/>
               <a:cs typeface="Segoe UI Light" panose="020B0502040204020203" pitchFamily="34" charset="0"/>
             </a:endParaRPr>
@@ -4075,14 +5022,14 @@
       </p:sp>
       <p:sp>
         <p:nvSpPr>
-          <p:cNvPr id="10" name="Rectangle 9"/>
+          <p:cNvPr id="6" name="Rectangle 5"/>
           <p:cNvSpPr/>
           <p:nvPr/>
         </p:nvSpPr>
         <p:spPr>
           <a:xfrm>
-            <a:off x="6240622" y="2282220"/>
-            <a:ext cx="5694704" cy="624329"/>
+            <a:off x="6497053" y="1118938"/>
+            <a:ext cx="5538294" cy="733925"/>
           </a:xfrm>
           <a:prstGeom prst="rect">
             <a:avLst/>
@@ -4116,13 +5063,13 @@
           <a:p>
             <a:pPr algn="ctr"/>
             <a:r>
-              <a:rPr lang="en-US" sz="2400" b="1" dirty="0" smtClean="0">
+              <a:rPr lang="en-US" sz="2000" b="1" dirty="0" smtClean="0">
                 <a:latin typeface="Calibri (Corps)"/>
                 <a:cs typeface="Segoe UI Light" panose="020B0502040204020203" pitchFamily="34" charset="0"/>
               </a:rPr>
-              <a:t>ES6 (and newer): Modern JavaScript</a:t>
-            </a:r>
-            <a:endParaRPr lang="en-US" sz="2400" b="1" dirty="0">
+              <a:t>Functions Expression</a:t>
+            </a:r>
+            <a:endParaRPr lang="en-US" sz="2000" b="1" dirty="0">
               <a:latin typeface="Calibri (Corps)"/>
               <a:cs typeface="Segoe UI Light" panose="020B0502040204020203" pitchFamily="34" charset="0"/>
             </a:endParaRPr>
@@ -4131,72 +5078,14 @@
       </p:sp>
       <p:sp>
         <p:nvSpPr>
-          <p:cNvPr id="5" name="Flèche droite 4"/>
+          <p:cNvPr id="7" name="Rectangle 6"/>
           <p:cNvSpPr/>
           <p:nvPr/>
         </p:nvSpPr>
         <p:spPr>
           <a:xfrm>
-            <a:off x="489527" y="1004625"/>
-            <a:ext cx="11445799" cy="1089631"/>
-          </a:xfrm>
-          <a:prstGeom prst="rightArrow">
-            <a:avLst/>
-          </a:prstGeom>
-          <a:solidFill>
-            <a:srgbClr val="CC3399"/>
-          </a:solidFill>
-          <a:ln w="19050">
-            <a:solidFill>
-              <a:schemeClr val="tx1"/>
-            </a:solidFill>
-          </a:ln>
-        </p:spPr>
-        <p:style>
-          <a:lnRef idx="2">
-            <a:schemeClr val="accent1">
-              <a:shade val="50000"/>
-            </a:schemeClr>
-          </a:lnRef>
-          <a:fillRef idx="1">
-            <a:schemeClr val="accent1"/>
-          </a:fillRef>
-          <a:effectRef idx="0">
-            <a:schemeClr val="accent1"/>
-          </a:effectRef>
-          <a:fontRef idx="minor">
-            <a:schemeClr val="lt1"/>
-          </a:fontRef>
-        </p:style>
-        <p:txBody>
-          <a:bodyPr rtlCol="0" anchor="ctr"/>
-          <a:lstStyle/>
-          <a:p>
-            <a:pPr algn="ctr"/>
-            <a:r>
-              <a:rPr lang="en-US" sz="2400" b="1" dirty="0" smtClean="0">
-                <a:latin typeface="Calibri (Corps)"/>
-                <a:cs typeface="Segoe UI Light" panose="020B0502040204020203" pitchFamily="34" charset="0"/>
-              </a:rPr>
-              <a:t>JavaScript Evolution</a:t>
-            </a:r>
-            <a:endParaRPr lang="en-US" sz="2400" b="1" dirty="0">
-              <a:latin typeface="Calibri (Corps)"/>
-              <a:cs typeface="Segoe UI Light" panose="020B0502040204020203" pitchFamily="34" charset="0"/>
-            </a:endParaRPr>
-          </a:p>
-        </p:txBody>
-      </p:sp>
-      <p:sp>
-        <p:nvSpPr>
-          <p:cNvPr id="11" name="Rectangle 10"/>
-          <p:cNvSpPr/>
-          <p:nvPr/>
-        </p:nvSpPr>
-        <p:spPr>
-          <a:xfrm>
-            <a:off x="93543" y="3094515"/>
-            <a:ext cx="5677663" cy="887938"/>
+            <a:off x="489528" y="2254617"/>
+            <a:ext cx="5538294" cy="1559394"/>
           </a:xfrm>
           <a:prstGeom prst="rect">
             <a:avLst/>
@@ -4232,7 +5121,6 @@
           <a:bodyPr rtlCol="0" anchor="ctr"/>
           <a:lstStyle/>
           <a:p>
-            <a:pPr algn="ctr"/>
             <a:r>
               <a:rPr lang="en-US" sz="2400" dirty="0" smtClean="0">
                 <a:solidFill>
@@ -4241,7 +5129,29 @@
                 <a:latin typeface="Calibri (Corps)"/>
                 <a:cs typeface="Segoe UI Light" panose="020B0502040204020203" pitchFamily="34" charset="0"/>
               </a:rPr>
-              <a:t>Support in basically all browser, including old IE</a:t>
+              <a:t>Function multiply (a,b) {</a:t>
+            </a:r>
+          </a:p>
+          <a:p>
+            <a:r>
+              <a:rPr lang="en-US" sz="2400" dirty="0">
+                <a:solidFill>
+                  <a:srgbClr val="660066"/>
+                </a:solidFill>
+                <a:latin typeface="Calibri (Corps)"/>
+                <a:cs typeface="Segoe UI Light" panose="020B0502040204020203" pitchFamily="34" charset="0"/>
+              </a:rPr>
+              <a:t> </a:t>
+            </a:r>
+            <a:r>
+              <a:rPr lang="en-US" sz="2400" dirty="0" smtClean="0">
+                <a:solidFill>
+                  <a:srgbClr val="660066"/>
+                </a:solidFill>
+                <a:latin typeface="Calibri (Corps)"/>
+                <a:cs typeface="Segoe UI Light" panose="020B0502040204020203" pitchFamily="34" charset="0"/>
+              </a:rPr>
+              <a:t>  return a*b;</a:t>
             </a:r>
             <a:endParaRPr lang="en-US" sz="2400" dirty="0">
               <a:solidFill>
@@ -4251,18 +5161,37 @@
               <a:cs typeface="Segoe UI Light" panose="020B0502040204020203" pitchFamily="34" charset="0"/>
             </a:endParaRPr>
           </a:p>
-        </p:txBody>
-      </p:sp>
-      <p:sp>
-        <p:nvSpPr>
-          <p:cNvPr id="12" name="Rectangle 11"/>
+          <a:p>
+            <a:r>
+              <a:rPr lang="en-US" sz="2400" dirty="0" smtClean="0">
+                <a:solidFill>
+                  <a:srgbClr val="660066"/>
+                </a:solidFill>
+                <a:latin typeface="Calibri (Corps)"/>
+                <a:cs typeface="Segoe UI Light" panose="020B0502040204020203" pitchFamily="34" charset="0"/>
+              </a:rPr>
+              <a:t>}</a:t>
+            </a:r>
+            <a:endParaRPr lang="en-US" sz="2400" dirty="0">
+              <a:solidFill>
+                <a:srgbClr val="660066"/>
+              </a:solidFill>
+              <a:latin typeface="Calibri (Corps)"/>
+              <a:cs typeface="Segoe UI Light" panose="020B0502040204020203" pitchFamily="34" charset="0"/>
+            </a:endParaRPr>
+          </a:p>
+        </p:txBody>
+      </p:sp>
+      <p:sp>
+        <p:nvSpPr>
+          <p:cNvPr id="9" name="Rectangle 8"/>
           <p:cNvSpPr/>
           <p:nvPr/>
         </p:nvSpPr>
         <p:spPr>
           <a:xfrm>
-            <a:off x="93543" y="4170418"/>
-            <a:ext cx="5677663" cy="887938"/>
+            <a:off x="6497053" y="2254617"/>
+            <a:ext cx="5538294" cy="1559394"/>
           </a:xfrm>
           <a:prstGeom prst="rect">
             <a:avLst/>
@@ -4298,7 +5227,6 @@
           <a:bodyPr rtlCol="0" anchor="ctr"/>
           <a:lstStyle/>
           <a:p>
-            <a:pPr algn="ctr"/>
             <a:r>
               <a:rPr lang="en-US" sz="2400" dirty="0" smtClean="0">
                 <a:solidFill>
@@ -4307,7 +5235,29 @@
                 <a:latin typeface="Calibri (Corps)"/>
                 <a:cs typeface="Segoe UI Light" panose="020B0502040204020203" pitchFamily="34" charset="0"/>
               </a:rPr>
-              <a:t>Only had var, not let or const</a:t>
+              <a:t>Const multiply =Function multiply (a,b) {</a:t>
+            </a:r>
+          </a:p>
+          <a:p>
+            <a:r>
+              <a:rPr lang="en-US" sz="2400" dirty="0">
+                <a:solidFill>
+                  <a:srgbClr val="660066"/>
+                </a:solidFill>
+                <a:latin typeface="Calibri (Corps)"/>
+                <a:cs typeface="Segoe UI Light" panose="020B0502040204020203" pitchFamily="34" charset="0"/>
+              </a:rPr>
+              <a:t> </a:t>
+            </a:r>
+            <a:r>
+              <a:rPr lang="en-US" sz="2400" dirty="0" smtClean="0">
+                <a:solidFill>
+                  <a:srgbClr val="660066"/>
+                </a:solidFill>
+                <a:latin typeface="Calibri (Corps)"/>
+                <a:cs typeface="Segoe UI Light" panose="020B0502040204020203" pitchFamily="34" charset="0"/>
+              </a:rPr>
+              <a:t>  return a*b;</a:t>
             </a:r>
             <a:endParaRPr lang="en-US" sz="2400" dirty="0">
               <a:solidFill>
@@ -4317,54 +5267,7 @@
               <a:cs typeface="Segoe UI Light" panose="020B0502040204020203" pitchFamily="34" charset="0"/>
             </a:endParaRPr>
           </a:p>
-        </p:txBody>
-      </p:sp>
-      <p:sp>
-        <p:nvSpPr>
-          <p:cNvPr id="13" name="Rectangle 12"/>
-          <p:cNvSpPr/>
-          <p:nvPr/>
-        </p:nvSpPr>
-        <p:spPr>
-          <a:xfrm>
-            <a:off x="93543" y="5246321"/>
-            <a:ext cx="5677663" cy="887938"/>
-          </a:xfrm>
-          <a:prstGeom prst="rect">
-            <a:avLst/>
-          </a:prstGeom>
-          <a:solidFill>
-            <a:srgbClr val="CC3399">
-              <a:alpha val="29020"/>
-            </a:srgbClr>
-          </a:solidFill>
-          <a:ln w="28575">
-            <a:solidFill>
-              <a:srgbClr val="660066"/>
-            </a:solidFill>
-          </a:ln>
-        </p:spPr>
-        <p:style>
-          <a:lnRef idx="2">
-            <a:schemeClr val="accent1">
-              <a:shade val="50000"/>
-            </a:schemeClr>
-          </a:lnRef>
-          <a:fillRef idx="1">
-            <a:schemeClr val="accent1"/>
-          </a:fillRef>
-          <a:effectRef idx="0">
-            <a:schemeClr val="accent1"/>
-          </a:effectRef>
-          <a:fontRef idx="minor">
-            <a:schemeClr val="lt1"/>
-          </a:fontRef>
-        </p:style>
-        <p:txBody>
-          <a:bodyPr rtlCol="0" anchor="ctr"/>
-          <a:lstStyle/>
-          <a:p>
-            <a:pPr algn="ctr"/>
+          <a:p>
             <a:r>
               <a:rPr lang="en-US" sz="2400" dirty="0" smtClean="0">
                 <a:solidFill>
@@ -4373,7 +5276,7 @@
                 <a:latin typeface="Calibri (Corps)"/>
                 <a:cs typeface="Segoe UI Light" panose="020B0502040204020203" pitchFamily="34" charset="0"/>
               </a:rPr>
-              <a:t>Generally same syntax as ES6, but quite some missing features</a:t>
+              <a:t>}</a:t>
             </a:r>
             <a:endParaRPr lang="en-US" sz="2400" dirty="0">
               <a:solidFill>
@@ -4387,263 +5290,14 @@
       </p:sp>
       <p:sp>
         <p:nvSpPr>
-          <p:cNvPr id="14" name="Rectangle 13"/>
+          <p:cNvPr id="10" name="Rectangle 9"/>
           <p:cNvSpPr/>
           <p:nvPr/>
         </p:nvSpPr>
         <p:spPr>
           <a:xfrm>
-            <a:off x="6249142" y="3094515"/>
-            <a:ext cx="5677663" cy="887938"/>
-          </a:xfrm>
-          <a:prstGeom prst="rect">
-            <a:avLst/>
-          </a:prstGeom>
-          <a:solidFill>
-            <a:srgbClr val="CC3399">
-              <a:alpha val="29020"/>
-            </a:srgbClr>
-          </a:solidFill>
-          <a:ln w="28575">
-            <a:solidFill>
-              <a:srgbClr val="660066"/>
-            </a:solidFill>
-          </a:ln>
-        </p:spPr>
-        <p:style>
-          <a:lnRef idx="2">
-            <a:schemeClr val="accent1">
-              <a:shade val="50000"/>
-            </a:schemeClr>
-          </a:lnRef>
-          <a:fillRef idx="1">
-            <a:schemeClr val="accent1"/>
-          </a:fillRef>
-          <a:effectRef idx="0">
-            <a:schemeClr val="accent1"/>
-          </a:effectRef>
-          <a:fontRef idx="minor">
-            <a:schemeClr val="lt1"/>
-          </a:fontRef>
-        </p:style>
-        <p:txBody>
-          <a:bodyPr rtlCol="0" anchor="ctr"/>
-          <a:lstStyle/>
-          <a:p>
-            <a:pPr algn="ctr"/>
-            <a:r>
-              <a:rPr lang="en-US" sz="2400" dirty="0" smtClean="0">
-                <a:solidFill>
-                  <a:srgbClr val="660066"/>
-                </a:solidFill>
-                <a:latin typeface="Calibri (Corps)"/>
-                <a:cs typeface="Segoe UI Light" panose="020B0502040204020203" pitchFamily="34" charset="0"/>
-              </a:rPr>
-              <a:t>Supported in modern browsers, can (mostly) be transpiled to ES5</a:t>
-            </a:r>
-            <a:endParaRPr lang="en-US" sz="2400" dirty="0">
-              <a:solidFill>
-                <a:srgbClr val="660066"/>
-              </a:solidFill>
-              <a:latin typeface="Calibri (Corps)"/>
-              <a:cs typeface="Segoe UI Light" panose="020B0502040204020203" pitchFamily="34" charset="0"/>
-            </a:endParaRPr>
-          </a:p>
-        </p:txBody>
-      </p:sp>
-      <p:sp>
-        <p:nvSpPr>
-          <p:cNvPr id="15" name="Rectangle 14"/>
-          <p:cNvSpPr/>
-          <p:nvPr/>
-        </p:nvSpPr>
-        <p:spPr>
-          <a:xfrm>
-            <a:off x="6257663" y="4170418"/>
-            <a:ext cx="5677663" cy="887938"/>
-          </a:xfrm>
-          <a:prstGeom prst="rect">
-            <a:avLst/>
-          </a:prstGeom>
-          <a:solidFill>
-            <a:srgbClr val="CC3399">
-              <a:alpha val="29020"/>
-            </a:srgbClr>
-          </a:solidFill>
-          <a:ln w="28575">
-            <a:solidFill>
-              <a:srgbClr val="660066"/>
-            </a:solidFill>
-          </a:ln>
-        </p:spPr>
-        <p:style>
-          <a:lnRef idx="2">
-            <a:schemeClr val="accent1">
-              <a:shade val="50000"/>
-            </a:schemeClr>
-          </a:lnRef>
-          <a:fillRef idx="1">
-            <a:schemeClr val="accent1"/>
-          </a:fillRef>
-          <a:effectRef idx="0">
-            <a:schemeClr val="accent1"/>
-          </a:effectRef>
-          <a:fontRef idx="minor">
-            <a:schemeClr val="lt1"/>
-          </a:fontRef>
-        </p:style>
-        <p:txBody>
-          <a:bodyPr rtlCol="0" anchor="ctr"/>
-          <a:lstStyle/>
-          <a:p>
-            <a:pPr algn="ctr"/>
-            <a:r>
-              <a:rPr lang="en-US" sz="2400" dirty="0" smtClean="0">
-                <a:solidFill>
-                  <a:srgbClr val="660066"/>
-                </a:solidFill>
-                <a:latin typeface="Calibri (Corps)"/>
-                <a:cs typeface="Segoe UI Light" panose="020B0502040204020203" pitchFamily="34" charset="0"/>
-              </a:rPr>
-              <a:t>Many new features that help us write cleaner, better &amp; faster code</a:t>
-            </a:r>
-            <a:endParaRPr lang="en-US" sz="2400" dirty="0">
-              <a:solidFill>
-                <a:srgbClr val="660066"/>
-              </a:solidFill>
-              <a:latin typeface="Calibri (Corps)"/>
-              <a:cs typeface="Segoe UI Light" panose="020B0502040204020203" pitchFamily="34" charset="0"/>
-            </a:endParaRPr>
-          </a:p>
-        </p:txBody>
-      </p:sp>
-      <p:sp>
-        <p:nvSpPr>
-          <p:cNvPr id="16" name="Rectangle 15"/>
-          <p:cNvSpPr/>
-          <p:nvPr/>
-        </p:nvSpPr>
-        <p:spPr>
-          <a:xfrm>
-            <a:off x="6257663" y="5246321"/>
-            <a:ext cx="5677663" cy="887938"/>
-          </a:xfrm>
-          <a:prstGeom prst="rect">
-            <a:avLst/>
-          </a:prstGeom>
-          <a:solidFill>
-            <a:srgbClr val="CC3399">
-              <a:alpha val="29020"/>
-            </a:srgbClr>
-          </a:solidFill>
-          <a:ln w="28575">
-            <a:solidFill>
-              <a:srgbClr val="660066"/>
-            </a:solidFill>
-          </a:ln>
-        </p:spPr>
-        <p:style>
-          <a:lnRef idx="2">
-            <a:schemeClr val="accent1">
-              <a:shade val="50000"/>
-            </a:schemeClr>
-          </a:lnRef>
-          <a:fillRef idx="1">
-            <a:schemeClr val="accent1"/>
-          </a:fillRef>
-          <a:effectRef idx="0">
-            <a:schemeClr val="accent1"/>
-          </a:effectRef>
-          <a:fontRef idx="minor">
-            <a:schemeClr val="lt1"/>
-          </a:fontRef>
-        </p:style>
-        <p:txBody>
-          <a:bodyPr rtlCol="0" anchor="ctr"/>
-          <a:lstStyle/>
-          <a:p>
-            <a:pPr algn="ctr"/>
-            <a:r>
-              <a:rPr lang="en-US" sz="2400" dirty="0" smtClean="0">
-                <a:solidFill>
-                  <a:srgbClr val="660066"/>
-                </a:solidFill>
-                <a:latin typeface="Calibri (Corps)"/>
-                <a:cs typeface="Segoe UI Light" panose="020B0502040204020203" pitchFamily="34" charset="0"/>
-              </a:rPr>
-              <a:t>Still under active development, but ES6 was a big step forward</a:t>
-            </a:r>
-            <a:endParaRPr lang="en-US" sz="2400" dirty="0">
-              <a:solidFill>
-                <a:srgbClr val="660066"/>
-              </a:solidFill>
-              <a:latin typeface="Calibri (Corps)"/>
-              <a:cs typeface="Segoe UI Light" panose="020B0502040204020203" pitchFamily="34" charset="0"/>
-            </a:endParaRPr>
-          </a:p>
-        </p:txBody>
-      </p:sp>
-      <p:sp>
-        <p:nvSpPr>
-          <p:cNvPr id="17" name="Flèche droite 16"/>
-          <p:cNvSpPr/>
-          <p:nvPr/>
-        </p:nvSpPr>
-        <p:spPr>
-          <a:xfrm rot="5400000">
-            <a:off x="8268993" y="1479264"/>
-            <a:ext cx="1409269" cy="587553"/>
-          </a:xfrm>
-          <a:prstGeom prst="rightArrow">
-            <a:avLst/>
-          </a:prstGeom>
-          <a:solidFill>
-            <a:schemeClr val="accent2"/>
-          </a:solidFill>
-          <a:ln w="19050">
-            <a:solidFill>
-              <a:schemeClr val="tx1"/>
-            </a:solidFill>
-          </a:ln>
-        </p:spPr>
-        <p:style>
-          <a:lnRef idx="2">
-            <a:schemeClr val="accent1">
-              <a:shade val="50000"/>
-            </a:schemeClr>
-          </a:lnRef>
-          <a:fillRef idx="1">
-            <a:schemeClr val="accent1"/>
-          </a:fillRef>
-          <a:effectRef idx="0">
-            <a:schemeClr val="accent1"/>
-          </a:effectRef>
-          <a:fontRef idx="minor">
-            <a:schemeClr val="lt1"/>
-          </a:fontRef>
-        </p:style>
-        <p:txBody>
-          <a:bodyPr rtlCol="0" anchor="ctr"/>
-          <a:lstStyle/>
-          <a:p>
-            <a:pPr algn="ctr"/>
-            <a:endParaRPr lang="en-US" sz="2400" b="1" dirty="0">
-              <a:latin typeface="Calibri (Corps)"/>
-              <a:cs typeface="Segoe UI Light" panose="020B0502040204020203" pitchFamily="34" charset="0"/>
-            </a:endParaRPr>
-          </a:p>
-        </p:txBody>
-      </p:sp>
-      <p:sp>
-        <p:nvSpPr>
-          <p:cNvPr id="18" name="Rectangle 17"/>
-          <p:cNvSpPr/>
-          <p:nvPr/>
-        </p:nvSpPr>
-        <p:spPr>
-          <a:xfrm>
-            <a:off x="7162876" y="123295"/>
-            <a:ext cx="3621504" cy="881330"/>
+            <a:off x="489527" y="4215765"/>
+            <a:ext cx="5538294" cy="1135679"/>
           </a:xfrm>
           <a:prstGeom prst="rect">
             <a:avLst/>
@@ -4679,13 +5333,85 @@
           <a:p>
             <a:pPr algn="ctr"/>
             <a:r>
+              <a:rPr lang="en-US" sz="2000" dirty="0" smtClean="0">
+                <a:latin typeface="Calibri (Corps)"/>
+                <a:cs typeface="Segoe UI Light" panose="020B0502040204020203" pitchFamily="34" charset="0"/>
+              </a:rPr>
+              <a:t>Hoisted to top, can be declared anywhere in the file (i.e. also after it’s used)</a:t>
+            </a:r>
+            <a:endParaRPr lang="en-US" sz="2000" dirty="0">
+              <a:latin typeface="Calibri (Corps)"/>
+              <a:cs typeface="Segoe UI Light" panose="020B0502040204020203" pitchFamily="34" charset="0"/>
+            </a:endParaRPr>
+          </a:p>
+        </p:txBody>
+      </p:sp>
+      <p:sp>
+        <p:nvSpPr>
+          <p:cNvPr id="11" name="Rectangle 10"/>
+          <p:cNvSpPr/>
+          <p:nvPr/>
+        </p:nvSpPr>
+        <p:spPr>
+          <a:xfrm>
+            <a:off x="6497053" y="4215765"/>
+            <a:ext cx="5538294" cy="1135679"/>
+          </a:xfrm>
+          <a:prstGeom prst="rect">
+            <a:avLst/>
+          </a:prstGeom>
+          <a:solidFill>
+            <a:schemeClr val="accent2"/>
+          </a:solidFill>
+          <a:ln w="19050">
+            <a:solidFill>
+              <a:schemeClr val="tx1"/>
+            </a:solidFill>
+          </a:ln>
+        </p:spPr>
+        <p:style>
+          <a:lnRef idx="2">
+            <a:schemeClr val="accent1">
+              <a:shade val="50000"/>
+            </a:schemeClr>
+          </a:lnRef>
+          <a:fillRef idx="1">
+            <a:schemeClr val="accent1"/>
+          </a:fillRef>
+          <a:effectRef idx="0">
+            <a:schemeClr val="accent1"/>
+          </a:effectRef>
+          <a:fontRef idx="minor">
+            <a:schemeClr val="lt1"/>
+          </a:fontRef>
+        </p:style>
+        <p:txBody>
+          <a:bodyPr rtlCol="0" anchor="ctr"/>
+          <a:lstStyle/>
+          <a:p>
+            <a:pPr algn="ctr"/>
+            <a:r>
+              <a:rPr lang="en-US" sz="2000" dirty="0" smtClean="0">
+                <a:latin typeface="Calibri (Corps)"/>
+                <a:cs typeface="Segoe UI Light" panose="020B0502040204020203" pitchFamily="34" charset="0"/>
+              </a:rPr>
+              <a:t>Hoisted to top but not initialized/ defined, </a:t>
+            </a:r>
+            <a:r>
               <a:rPr lang="en-US" sz="2000" b="1" dirty="0" smtClean="0">
                 <a:latin typeface="Calibri (Corps)"/>
                 <a:cs typeface="Segoe UI Light" panose="020B0502040204020203" pitchFamily="34" charset="0"/>
               </a:rPr>
-              <a:t>Taught in this course (from the beginning on)!</a:t>
-            </a:r>
-            <a:endParaRPr lang="en-US" sz="2000" b="1" dirty="0">
+              <a:t>can’t</a:t>
+            </a:r>
+            <a:r>
+              <a:rPr lang="en-US" sz="2000" dirty="0" smtClean="0">
+                <a:latin typeface="Calibri (Corps)"/>
+                <a:cs typeface="Segoe UI Light" panose="020B0502040204020203" pitchFamily="34" charset="0"/>
+              </a:rPr>
+              <a:t> be declared anywhere in the file (i.e. not after it’s used)</a:t>
+            </a:r>
+            <a:endParaRPr lang="en-US" sz="2000" dirty="0">
               <a:latin typeface="Calibri (Corps)"/>
               <a:cs typeface="Segoe UI Light" panose="020B0502040204020203" pitchFamily="34" charset="0"/>
             </a:endParaRPr>
@@ -4695,7 +5421,7 @@
     </p:spTree>
     <p:extLst>
       <p:ext uri="{BB962C8B-B14F-4D97-AF65-F5344CB8AC3E}">
-        <p14:creationId xmlns:p14="http://schemas.microsoft.com/office/powerpoint/2010/main" val="894406583"/>
+        <p14:creationId xmlns:p14="http://schemas.microsoft.com/office/powerpoint/2010/main" val="2847704465"/>
       </p:ext>
     </p:extLst>
   </p:cSld>
@@ -4749,6 +5475,779 @@
                 <a:ea typeface="Segoe UI Black" panose="020B0A02040204020203" pitchFamily="34" charset="0"/>
                 <a:cs typeface="Segoe UI Semibold" panose="020B0702040204020203" pitchFamily="34" charset="0"/>
               </a:rPr>
+              <a:t>ES5 vs ES6</a:t>
+            </a:r>
+          </a:p>
+        </p:txBody>
+      </p:sp>
+      <p:cxnSp>
+        <p:nvCxnSpPr>
+          <p:cNvPr id="7" name="Connecteur droit 6"/>
+          <p:cNvCxnSpPr/>
+          <p:nvPr/>
+        </p:nvCxnSpPr>
+        <p:spPr>
+          <a:xfrm>
+            <a:off x="5999898" y="193964"/>
+            <a:ext cx="12032" cy="6279025"/>
+          </a:xfrm>
+          <a:prstGeom prst="line">
+            <a:avLst/>
+          </a:prstGeom>
+          <a:ln w="76200">
+            <a:solidFill>
+              <a:srgbClr val="CC3399"/>
+            </a:solidFill>
+            <a:prstDash val="dash"/>
+          </a:ln>
+        </p:spPr>
+        <p:style>
+          <a:lnRef idx="1">
+            <a:schemeClr val="accent1"/>
+          </a:lnRef>
+          <a:fillRef idx="0">
+            <a:schemeClr val="accent1"/>
+          </a:fillRef>
+          <a:effectRef idx="0">
+            <a:schemeClr val="accent1"/>
+          </a:effectRef>
+          <a:fontRef idx="minor">
+            <a:schemeClr val="tx1"/>
+          </a:fontRef>
+        </p:style>
+      </p:cxnSp>
+      <p:sp>
+        <p:nvSpPr>
+          <p:cNvPr id="9" name="Rectangle 8"/>
+          <p:cNvSpPr/>
+          <p:nvPr/>
+        </p:nvSpPr>
+        <p:spPr>
+          <a:xfrm>
+            <a:off x="76503" y="2282221"/>
+            <a:ext cx="5694704" cy="624329"/>
+          </a:xfrm>
+          <a:prstGeom prst="rect">
+            <a:avLst/>
+          </a:prstGeom>
+          <a:solidFill>
+            <a:srgbClr val="660066"/>
+          </a:solidFill>
+          <a:ln>
+            <a:noFill/>
+          </a:ln>
+        </p:spPr>
+        <p:style>
+          <a:lnRef idx="2">
+            <a:schemeClr val="accent1">
+              <a:shade val="50000"/>
+            </a:schemeClr>
+          </a:lnRef>
+          <a:fillRef idx="1">
+            <a:schemeClr val="accent1"/>
+          </a:fillRef>
+          <a:effectRef idx="0">
+            <a:schemeClr val="accent1"/>
+          </a:effectRef>
+          <a:fontRef idx="minor">
+            <a:schemeClr val="lt1"/>
+          </a:fontRef>
+        </p:style>
+        <p:txBody>
+          <a:bodyPr rtlCol="0" anchor="ctr"/>
+          <a:lstStyle/>
+          <a:p>
+            <a:pPr algn="ctr"/>
+            <a:r>
+              <a:rPr lang="en-US" sz="2400" b="1" dirty="0" smtClean="0">
+                <a:latin typeface="Calibri (Corps)"/>
+                <a:cs typeface="Segoe UI Light" panose="020B0502040204020203" pitchFamily="34" charset="0"/>
+              </a:rPr>
+              <a:t>ES5 (and older)</a:t>
+            </a:r>
+            <a:endParaRPr lang="en-US" sz="2400" b="1" dirty="0">
+              <a:latin typeface="Calibri (Corps)"/>
+              <a:cs typeface="Segoe UI Light" panose="020B0502040204020203" pitchFamily="34" charset="0"/>
+            </a:endParaRPr>
+          </a:p>
+        </p:txBody>
+      </p:sp>
+      <p:sp>
+        <p:nvSpPr>
+          <p:cNvPr id="10" name="Rectangle 9"/>
+          <p:cNvSpPr/>
+          <p:nvPr/>
+        </p:nvSpPr>
+        <p:spPr>
+          <a:xfrm>
+            <a:off x="6240622" y="2282220"/>
+            <a:ext cx="5694704" cy="624329"/>
+          </a:xfrm>
+          <a:prstGeom prst="rect">
+            <a:avLst/>
+          </a:prstGeom>
+          <a:solidFill>
+            <a:srgbClr val="660066"/>
+          </a:solidFill>
+          <a:ln>
+            <a:noFill/>
+          </a:ln>
+        </p:spPr>
+        <p:style>
+          <a:lnRef idx="2">
+            <a:schemeClr val="accent1">
+              <a:shade val="50000"/>
+            </a:schemeClr>
+          </a:lnRef>
+          <a:fillRef idx="1">
+            <a:schemeClr val="accent1"/>
+          </a:fillRef>
+          <a:effectRef idx="0">
+            <a:schemeClr val="accent1"/>
+          </a:effectRef>
+          <a:fontRef idx="minor">
+            <a:schemeClr val="lt1"/>
+          </a:fontRef>
+        </p:style>
+        <p:txBody>
+          <a:bodyPr rtlCol="0" anchor="ctr"/>
+          <a:lstStyle/>
+          <a:p>
+            <a:pPr algn="ctr"/>
+            <a:r>
+              <a:rPr lang="en-US" sz="2400" b="1" dirty="0" smtClean="0">
+                <a:latin typeface="Calibri (Corps)"/>
+                <a:cs typeface="Segoe UI Light" panose="020B0502040204020203" pitchFamily="34" charset="0"/>
+              </a:rPr>
+              <a:t>ES6 (and newer): Modern JavaScript</a:t>
+            </a:r>
+            <a:endParaRPr lang="en-US" sz="2400" b="1" dirty="0">
+              <a:latin typeface="Calibri (Corps)"/>
+              <a:cs typeface="Segoe UI Light" panose="020B0502040204020203" pitchFamily="34" charset="0"/>
+            </a:endParaRPr>
+          </a:p>
+        </p:txBody>
+      </p:sp>
+      <p:sp>
+        <p:nvSpPr>
+          <p:cNvPr id="5" name="Flèche droite 4"/>
+          <p:cNvSpPr/>
+          <p:nvPr/>
+        </p:nvSpPr>
+        <p:spPr>
+          <a:xfrm>
+            <a:off x="489527" y="1004625"/>
+            <a:ext cx="11445799" cy="1089631"/>
+          </a:xfrm>
+          <a:prstGeom prst="rightArrow">
+            <a:avLst/>
+          </a:prstGeom>
+          <a:solidFill>
+            <a:srgbClr val="CC3399"/>
+          </a:solidFill>
+          <a:ln w="19050">
+            <a:solidFill>
+              <a:schemeClr val="tx1"/>
+            </a:solidFill>
+          </a:ln>
+        </p:spPr>
+        <p:style>
+          <a:lnRef idx="2">
+            <a:schemeClr val="accent1">
+              <a:shade val="50000"/>
+            </a:schemeClr>
+          </a:lnRef>
+          <a:fillRef idx="1">
+            <a:schemeClr val="accent1"/>
+          </a:fillRef>
+          <a:effectRef idx="0">
+            <a:schemeClr val="accent1"/>
+          </a:effectRef>
+          <a:fontRef idx="minor">
+            <a:schemeClr val="lt1"/>
+          </a:fontRef>
+        </p:style>
+        <p:txBody>
+          <a:bodyPr rtlCol="0" anchor="ctr"/>
+          <a:lstStyle/>
+          <a:p>
+            <a:pPr algn="ctr"/>
+            <a:r>
+              <a:rPr lang="en-US" sz="2400" b="1" dirty="0" smtClean="0">
+                <a:latin typeface="Calibri (Corps)"/>
+                <a:cs typeface="Segoe UI Light" panose="020B0502040204020203" pitchFamily="34" charset="0"/>
+              </a:rPr>
+              <a:t>JavaScript Evolution</a:t>
+            </a:r>
+            <a:endParaRPr lang="en-US" sz="2400" b="1" dirty="0">
+              <a:latin typeface="Calibri (Corps)"/>
+              <a:cs typeface="Segoe UI Light" panose="020B0502040204020203" pitchFamily="34" charset="0"/>
+            </a:endParaRPr>
+          </a:p>
+        </p:txBody>
+      </p:sp>
+      <p:sp>
+        <p:nvSpPr>
+          <p:cNvPr id="11" name="Rectangle 10"/>
+          <p:cNvSpPr/>
+          <p:nvPr/>
+        </p:nvSpPr>
+        <p:spPr>
+          <a:xfrm>
+            <a:off x="93543" y="3094515"/>
+            <a:ext cx="5677663" cy="887938"/>
+          </a:xfrm>
+          <a:prstGeom prst="rect">
+            <a:avLst/>
+          </a:prstGeom>
+          <a:solidFill>
+            <a:srgbClr val="CC3399">
+              <a:alpha val="29020"/>
+            </a:srgbClr>
+          </a:solidFill>
+          <a:ln w="28575">
+            <a:solidFill>
+              <a:srgbClr val="660066"/>
+            </a:solidFill>
+          </a:ln>
+        </p:spPr>
+        <p:style>
+          <a:lnRef idx="2">
+            <a:schemeClr val="accent1">
+              <a:shade val="50000"/>
+            </a:schemeClr>
+          </a:lnRef>
+          <a:fillRef idx="1">
+            <a:schemeClr val="accent1"/>
+          </a:fillRef>
+          <a:effectRef idx="0">
+            <a:schemeClr val="accent1"/>
+          </a:effectRef>
+          <a:fontRef idx="minor">
+            <a:schemeClr val="lt1"/>
+          </a:fontRef>
+        </p:style>
+        <p:txBody>
+          <a:bodyPr rtlCol="0" anchor="ctr"/>
+          <a:lstStyle/>
+          <a:p>
+            <a:pPr algn="ctr"/>
+            <a:r>
+              <a:rPr lang="en-US" sz="2400" dirty="0" smtClean="0">
+                <a:solidFill>
+                  <a:srgbClr val="660066"/>
+                </a:solidFill>
+                <a:latin typeface="Calibri (Corps)"/>
+                <a:cs typeface="Segoe UI Light" panose="020B0502040204020203" pitchFamily="34" charset="0"/>
+              </a:rPr>
+              <a:t>Support in basically all browser, including old IE</a:t>
+            </a:r>
+            <a:endParaRPr lang="en-US" sz="2400" dirty="0">
+              <a:solidFill>
+                <a:srgbClr val="660066"/>
+              </a:solidFill>
+              <a:latin typeface="Calibri (Corps)"/>
+              <a:cs typeface="Segoe UI Light" panose="020B0502040204020203" pitchFamily="34" charset="0"/>
+            </a:endParaRPr>
+          </a:p>
+        </p:txBody>
+      </p:sp>
+      <p:sp>
+        <p:nvSpPr>
+          <p:cNvPr id="12" name="Rectangle 11"/>
+          <p:cNvSpPr/>
+          <p:nvPr/>
+        </p:nvSpPr>
+        <p:spPr>
+          <a:xfrm>
+            <a:off x="93543" y="4170418"/>
+            <a:ext cx="5677663" cy="887938"/>
+          </a:xfrm>
+          <a:prstGeom prst="rect">
+            <a:avLst/>
+          </a:prstGeom>
+          <a:solidFill>
+            <a:srgbClr val="CC3399">
+              <a:alpha val="29020"/>
+            </a:srgbClr>
+          </a:solidFill>
+          <a:ln w="28575">
+            <a:solidFill>
+              <a:srgbClr val="660066"/>
+            </a:solidFill>
+          </a:ln>
+        </p:spPr>
+        <p:style>
+          <a:lnRef idx="2">
+            <a:schemeClr val="accent1">
+              <a:shade val="50000"/>
+            </a:schemeClr>
+          </a:lnRef>
+          <a:fillRef idx="1">
+            <a:schemeClr val="accent1"/>
+          </a:fillRef>
+          <a:effectRef idx="0">
+            <a:schemeClr val="accent1"/>
+          </a:effectRef>
+          <a:fontRef idx="minor">
+            <a:schemeClr val="lt1"/>
+          </a:fontRef>
+        </p:style>
+        <p:txBody>
+          <a:bodyPr rtlCol="0" anchor="ctr"/>
+          <a:lstStyle/>
+          <a:p>
+            <a:pPr algn="ctr"/>
+            <a:r>
+              <a:rPr lang="en-US" sz="2400" dirty="0" smtClean="0">
+                <a:solidFill>
+                  <a:srgbClr val="660066"/>
+                </a:solidFill>
+                <a:latin typeface="Calibri (Corps)"/>
+                <a:cs typeface="Segoe UI Light" panose="020B0502040204020203" pitchFamily="34" charset="0"/>
+              </a:rPr>
+              <a:t>Only had var, not let or const</a:t>
+            </a:r>
+            <a:endParaRPr lang="en-US" sz="2400" dirty="0">
+              <a:solidFill>
+                <a:srgbClr val="660066"/>
+              </a:solidFill>
+              <a:latin typeface="Calibri (Corps)"/>
+              <a:cs typeface="Segoe UI Light" panose="020B0502040204020203" pitchFamily="34" charset="0"/>
+            </a:endParaRPr>
+          </a:p>
+        </p:txBody>
+      </p:sp>
+      <p:sp>
+        <p:nvSpPr>
+          <p:cNvPr id="13" name="Rectangle 12"/>
+          <p:cNvSpPr/>
+          <p:nvPr/>
+        </p:nvSpPr>
+        <p:spPr>
+          <a:xfrm>
+            <a:off x="93543" y="5246321"/>
+            <a:ext cx="5677663" cy="887938"/>
+          </a:xfrm>
+          <a:prstGeom prst="rect">
+            <a:avLst/>
+          </a:prstGeom>
+          <a:solidFill>
+            <a:srgbClr val="CC3399">
+              <a:alpha val="29020"/>
+            </a:srgbClr>
+          </a:solidFill>
+          <a:ln w="28575">
+            <a:solidFill>
+              <a:srgbClr val="660066"/>
+            </a:solidFill>
+          </a:ln>
+        </p:spPr>
+        <p:style>
+          <a:lnRef idx="2">
+            <a:schemeClr val="accent1">
+              <a:shade val="50000"/>
+            </a:schemeClr>
+          </a:lnRef>
+          <a:fillRef idx="1">
+            <a:schemeClr val="accent1"/>
+          </a:fillRef>
+          <a:effectRef idx="0">
+            <a:schemeClr val="accent1"/>
+          </a:effectRef>
+          <a:fontRef idx="minor">
+            <a:schemeClr val="lt1"/>
+          </a:fontRef>
+        </p:style>
+        <p:txBody>
+          <a:bodyPr rtlCol="0" anchor="ctr"/>
+          <a:lstStyle/>
+          <a:p>
+            <a:pPr algn="ctr"/>
+            <a:r>
+              <a:rPr lang="en-US" sz="2400" dirty="0" smtClean="0">
+                <a:solidFill>
+                  <a:srgbClr val="660066"/>
+                </a:solidFill>
+                <a:latin typeface="Calibri (Corps)"/>
+                <a:cs typeface="Segoe UI Light" panose="020B0502040204020203" pitchFamily="34" charset="0"/>
+              </a:rPr>
+              <a:t>Generally same syntax as ES6, but quite some missing features</a:t>
+            </a:r>
+            <a:endParaRPr lang="en-US" sz="2400" dirty="0">
+              <a:solidFill>
+                <a:srgbClr val="660066"/>
+              </a:solidFill>
+              <a:latin typeface="Calibri (Corps)"/>
+              <a:cs typeface="Segoe UI Light" panose="020B0502040204020203" pitchFamily="34" charset="0"/>
+            </a:endParaRPr>
+          </a:p>
+        </p:txBody>
+      </p:sp>
+      <p:sp>
+        <p:nvSpPr>
+          <p:cNvPr id="14" name="Rectangle 13"/>
+          <p:cNvSpPr/>
+          <p:nvPr/>
+        </p:nvSpPr>
+        <p:spPr>
+          <a:xfrm>
+            <a:off x="6249142" y="3094515"/>
+            <a:ext cx="5677663" cy="887938"/>
+          </a:xfrm>
+          <a:prstGeom prst="rect">
+            <a:avLst/>
+          </a:prstGeom>
+          <a:solidFill>
+            <a:srgbClr val="CC3399">
+              <a:alpha val="29020"/>
+            </a:srgbClr>
+          </a:solidFill>
+          <a:ln w="28575">
+            <a:solidFill>
+              <a:srgbClr val="660066"/>
+            </a:solidFill>
+          </a:ln>
+        </p:spPr>
+        <p:style>
+          <a:lnRef idx="2">
+            <a:schemeClr val="accent1">
+              <a:shade val="50000"/>
+            </a:schemeClr>
+          </a:lnRef>
+          <a:fillRef idx="1">
+            <a:schemeClr val="accent1"/>
+          </a:fillRef>
+          <a:effectRef idx="0">
+            <a:schemeClr val="accent1"/>
+          </a:effectRef>
+          <a:fontRef idx="minor">
+            <a:schemeClr val="lt1"/>
+          </a:fontRef>
+        </p:style>
+        <p:txBody>
+          <a:bodyPr rtlCol="0" anchor="ctr"/>
+          <a:lstStyle/>
+          <a:p>
+            <a:pPr algn="ctr"/>
+            <a:r>
+              <a:rPr lang="en-US" sz="2400" dirty="0" smtClean="0">
+                <a:solidFill>
+                  <a:srgbClr val="660066"/>
+                </a:solidFill>
+                <a:latin typeface="Calibri (Corps)"/>
+                <a:cs typeface="Segoe UI Light" panose="020B0502040204020203" pitchFamily="34" charset="0"/>
+              </a:rPr>
+              <a:t>Supported in modern browsers, can (mostly) be transpiled to ES5</a:t>
+            </a:r>
+            <a:endParaRPr lang="en-US" sz="2400" dirty="0">
+              <a:solidFill>
+                <a:srgbClr val="660066"/>
+              </a:solidFill>
+              <a:latin typeface="Calibri (Corps)"/>
+              <a:cs typeface="Segoe UI Light" panose="020B0502040204020203" pitchFamily="34" charset="0"/>
+            </a:endParaRPr>
+          </a:p>
+        </p:txBody>
+      </p:sp>
+      <p:sp>
+        <p:nvSpPr>
+          <p:cNvPr id="15" name="Rectangle 14"/>
+          <p:cNvSpPr/>
+          <p:nvPr/>
+        </p:nvSpPr>
+        <p:spPr>
+          <a:xfrm>
+            <a:off x="6257663" y="4170418"/>
+            <a:ext cx="5677663" cy="887938"/>
+          </a:xfrm>
+          <a:prstGeom prst="rect">
+            <a:avLst/>
+          </a:prstGeom>
+          <a:solidFill>
+            <a:srgbClr val="CC3399">
+              <a:alpha val="29020"/>
+            </a:srgbClr>
+          </a:solidFill>
+          <a:ln w="28575">
+            <a:solidFill>
+              <a:srgbClr val="660066"/>
+            </a:solidFill>
+          </a:ln>
+        </p:spPr>
+        <p:style>
+          <a:lnRef idx="2">
+            <a:schemeClr val="accent1">
+              <a:shade val="50000"/>
+            </a:schemeClr>
+          </a:lnRef>
+          <a:fillRef idx="1">
+            <a:schemeClr val="accent1"/>
+          </a:fillRef>
+          <a:effectRef idx="0">
+            <a:schemeClr val="accent1"/>
+          </a:effectRef>
+          <a:fontRef idx="minor">
+            <a:schemeClr val="lt1"/>
+          </a:fontRef>
+        </p:style>
+        <p:txBody>
+          <a:bodyPr rtlCol="0" anchor="ctr"/>
+          <a:lstStyle/>
+          <a:p>
+            <a:pPr algn="ctr"/>
+            <a:r>
+              <a:rPr lang="en-US" sz="2400" dirty="0" smtClean="0">
+                <a:solidFill>
+                  <a:srgbClr val="660066"/>
+                </a:solidFill>
+                <a:latin typeface="Calibri (Corps)"/>
+                <a:cs typeface="Segoe UI Light" panose="020B0502040204020203" pitchFamily="34" charset="0"/>
+              </a:rPr>
+              <a:t>Many new features that help us write cleaner, better &amp; faster code</a:t>
+            </a:r>
+            <a:endParaRPr lang="en-US" sz="2400" dirty="0">
+              <a:solidFill>
+                <a:srgbClr val="660066"/>
+              </a:solidFill>
+              <a:latin typeface="Calibri (Corps)"/>
+              <a:cs typeface="Segoe UI Light" panose="020B0502040204020203" pitchFamily="34" charset="0"/>
+            </a:endParaRPr>
+          </a:p>
+        </p:txBody>
+      </p:sp>
+      <p:sp>
+        <p:nvSpPr>
+          <p:cNvPr id="16" name="Rectangle 15"/>
+          <p:cNvSpPr/>
+          <p:nvPr/>
+        </p:nvSpPr>
+        <p:spPr>
+          <a:xfrm>
+            <a:off x="6257663" y="5246321"/>
+            <a:ext cx="5677663" cy="887938"/>
+          </a:xfrm>
+          <a:prstGeom prst="rect">
+            <a:avLst/>
+          </a:prstGeom>
+          <a:solidFill>
+            <a:srgbClr val="CC3399">
+              <a:alpha val="29020"/>
+            </a:srgbClr>
+          </a:solidFill>
+          <a:ln w="28575">
+            <a:solidFill>
+              <a:srgbClr val="660066"/>
+            </a:solidFill>
+          </a:ln>
+        </p:spPr>
+        <p:style>
+          <a:lnRef idx="2">
+            <a:schemeClr val="accent1">
+              <a:shade val="50000"/>
+            </a:schemeClr>
+          </a:lnRef>
+          <a:fillRef idx="1">
+            <a:schemeClr val="accent1"/>
+          </a:fillRef>
+          <a:effectRef idx="0">
+            <a:schemeClr val="accent1"/>
+          </a:effectRef>
+          <a:fontRef idx="minor">
+            <a:schemeClr val="lt1"/>
+          </a:fontRef>
+        </p:style>
+        <p:txBody>
+          <a:bodyPr rtlCol="0" anchor="ctr"/>
+          <a:lstStyle/>
+          <a:p>
+            <a:pPr algn="ctr"/>
+            <a:r>
+              <a:rPr lang="en-US" sz="2400" dirty="0" smtClean="0">
+                <a:solidFill>
+                  <a:srgbClr val="660066"/>
+                </a:solidFill>
+                <a:latin typeface="Calibri (Corps)"/>
+                <a:cs typeface="Segoe UI Light" panose="020B0502040204020203" pitchFamily="34" charset="0"/>
+              </a:rPr>
+              <a:t>Still under active development, but ES6 was a big step forward</a:t>
+            </a:r>
+            <a:endParaRPr lang="en-US" sz="2400" dirty="0">
+              <a:solidFill>
+                <a:srgbClr val="660066"/>
+              </a:solidFill>
+              <a:latin typeface="Calibri (Corps)"/>
+              <a:cs typeface="Segoe UI Light" panose="020B0502040204020203" pitchFamily="34" charset="0"/>
+            </a:endParaRPr>
+          </a:p>
+        </p:txBody>
+      </p:sp>
+      <p:sp>
+        <p:nvSpPr>
+          <p:cNvPr id="17" name="Flèche droite 16"/>
+          <p:cNvSpPr/>
+          <p:nvPr/>
+        </p:nvSpPr>
+        <p:spPr>
+          <a:xfrm rot="5400000">
+            <a:off x="8268993" y="1479264"/>
+            <a:ext cx="1409269" cy="587553"/>
+          </a:xfrm>
+          <a:prstGeom prst="rightArrow">
+            <a:avLst/>
+          </a:prstGeom>
+          <a:solidFill>
+            <a:schemeClr val="accent2"/>
+          </a:solidFill>
+          <a:ln w="19050">
+            <a:solidFill>
+              <a:schemeClr val="tx1"/>
+            </a:solidFill>
+          </a:ln>
+        </p:spPr>
+        <p:style>
+          <a:lnRef idx="2">
+            <a:schemeClr val="accent1">
+              <a:shade val="50000"/>
+            </a:schemeClr>
+          </a:lnRef>
+          <a:fillRef idx="1">
+            <a:schemeClr val="accent1"/>
+          </a:fillRef>
+          <a:effectRef idx="0">
+            <a:schemeClr val="accent1"/>
+          </a:effectRef>
+          <a:fontRef idx="minor">
+            <a:schemeClr val="lt1"/>
+          </a:fontRef>
+        </p:style>
+        <p:txBody>
+          <a:bodyPr rtlCol="0" anchor="ctr"/>
+          <a:lstStyle/>
+          <a:p>
+            <a:pPr algn="ctr"/>
+            <a:endParaRPr lang="en-US" sz="2400" b="1" dirty="0">
+              <a:latin typeface="Calibri (Corps)"/>
+              <a:cs typeface="Segoe UI Light" panose="020B0502040204020203" pitchFamily="34" charset="0"/>
+            </a:endParaRPr>
+          </a:p>
+        </p:txBody>
+      </p:sp>
+      <p:sp>
+        <p:nvSpPr>
+          <p:cNvPr id="18" name="Rectangle 17"/>
+          <p:cNvSpPr/>
+          <p:nvPr/>
+        </p:nvSpPr>
+        <p:spPr>
+          <a:xfrm>
+            <a:off x="7162876" y="123295"/>
+            <a:ext cx="3621504" cy="881330"/>
+          </a:xfrm>
+          <a:prstGeom prst="rect">
+            <a:avLst/>
+          </a:prstGeom>
+          <a:solidFill>
+            <a:schemeClr val="accent2"/>
+          </a:solidFill>
+          <a:ln w="19050">
+            <a:solidFill>
+              <a:schemeClr val="tx1"/>
+            </a:solidFill>
+          </a:ln>
+        </p:spPr>
+        <p:style>
+          <a:lnRef idx="2">
+            <a:schemeClr val="accent1">
+              <a:shade val="50000"/>
+            </a:schemeClr>
+          </a:lnRef>
+          <a:fillRef idx="1">
+            <a:schemeClr val="accent1"/>
+          </a:fillRef>
+          <a:effectRef idx="0">
+            <a:schemeClr val="accent1"/>
+          </a:effectRef>
+          <a:fontRef idx="minor">
+            <a:schemeClr val="lt1"/>
+          </a:fontRef>
+        </p:style>
+        <p:txBody>
+          <a:bodyPr rtlCol="0" anchor="ctr"/>
+          <a:lstStyle/>
+          <a:p>
+            <a:pPr algn="ctr"/>
+            <a:r>
+              <a:rPr lang="en-US" sz="2000" b="1" dirty="0" smtClean="0">
+                <a:latin typeface="Calibri (Corps)"/>
+                <a:cs typeface="Segoe UI Light" panose="020B0502040204020203" pitchFamily="34" charset="0"/>
+              </a:rPr>
+              <a:t>Taught in this course (from the beginning on)!</a:t>
+            </a:r>
+            <a:endParaRPr lang="en-US" sz="2000" b="1" dirty="0">
+              <a:latin typeface="Calibri (Corps)"/>
+              <a:cs typeface="Segoe UI Light" panose="020B0502040204020203" pitchFamily="34" charset="0"/>
+            </a:endParaRPr>
+          </a:p>
+        </p:txBody>
+      </p:sp>
+    </p:spTree>
+    <p:extLst>
+      <p:ext uri="{BB962C8B-B14F-4D97-AF65-F5344CB8AC3E}">
+        <p14:creationId xmlns:p14="http://schemas.microsoft.com/office/powerpoint/2010/main" val="894406583"/>
+      </p:ext>
+    </p:extLst>
+  </p:cSld>
+  <p:clrMapOvr>
+    <a:masterClrMapping/>
+  </p:clrMapOvr>
+</p:sld>
+</file>
+
+<file path=ppt/slides/slide6.xml><?xml version="1.0" encoding="utf-8"?>
+<p:sld xmlns:a="http://schemas.openxmlformats.org/drawingml/2006/main" xmlns:r="http://schemas.openxmlformats.org/officeDocument/2006/relationships" xmlns:p="http://schemas.openxmlformats.org/presentationml/2006/main">
+  <p:cSld>
+    <p:spTree>
+      <p:nvGrpSpPr>
+        <p:cNvPr id="1" name=""/>
+        <p:cNvGrpSpPr/>
+        <p:nvPr/>
+      </p:nvGrpSpPr>
+      <p:grpSpPr>
+        <a:xfrm>
+          <a:off x="0" y="0"/>
+          <a:ext cx="0" cy="0"/>
+          <a:chOff x="0" y="0"/>
+          <a:chExt cx="0" cy="0"/>
+        </a:xfrm>
+      </p:grpSpPr>
+      <p:sp>
+        <p:nvSpPr>
+          <p:cNvPr id="4" name="ZoneTexte 3"/>
+          <p:cNvSpPr txBox="1"/>
+          <p:nvPr/>
+        </p:nvSpPr>
+        <p:spPr>
+          <a:xfrm>
+            <a:off x="489527" y="193964"/>
+            <a:ext cx="6007526" cy="523220"/>
+          </a:xfrm>
+          <a:prstGeom prst="rect">
+            <a:avLst/>
+          </a:prstGeom>
+          <a:noFill/>
+        </p:spPr>
+        <p:txBody>
+          <a:bodyPr wrap="square" rtlCol="0">
+            <a:spAutoFit/>
+          </a:bodyPr>
+          <a:lstStyle/>
+          <a:p>
+            <a:r>
+              <a:rPr lang="en-US" sz="2800" b="1" dirty="0" smtClean="0">
+                <a:ea typeface="Segoe UI Black" panose="020B0A02040204020203" pitchFamily="34" charset="0"/>
+                <a:cs typeface="Segoe UI Semibold" panose="020B0702040204020203" pitchFamily="34" charset="0"/>
+              </a:rPr>
               <a:t>Var vs let vs const</a:t>
             </a:r>
           </a:p>
@@ -5311,7 +6810,7 @@
 </p:sld>
 </file>
 
-<file path=ppt/slides/slide6.xml><?xml version="1.0" encoding="utf-8"?>
+<file path=ppt/slides/slide7.xml><?xml version="1.0" encoding="utf-8"?>
 <p:sld xmlns:a="http://schemas.openxmlformats.org/drawingml/2006/main" xmlns:r="http://schemas.openxmlformats.org/officeDocument/2006/relationships" xmlns:p="http://schemas.openxmlformats.org/presentationml/2006/main">
   <p:cSld>
     <p:spTree>
@@ -6480,7 +7979,7 @@
 </p:sld>
 </file>
 
-<file path=ppt/slides/slide7.xml><?xml version="1.0" encoding="utf-8"?>
+<file path=ppt/slides/slide8.xml><?xml version="1.0" encoding="utf-8"?>
 <p:sld xmlns:a="http://schemas.openxmlformats.org/drawingml/2006/main" xmlns:r="http://schemas.openxmlformats.org/officeDocument/2006/relationships" xmlns:p="http://schemas.openxmlformats.org/presentationml/2006/main">
   <p:cSld>
     <p:spTree>
@@ -7846,729 +9345,6 @@
 </p:sld>
 </file>
 
-<file path=ppt/slides/slide8.xml><?xml version="1.0" encoding="utf-8"?>
-<p:sld xmlns:a="http://schemas.openxmlformats.org/drawingml/2006/main" xmlns:r="http://schemas.openxmlformats.org/officeDocument/2006/relationships" xmlns:p="http://schemas.openxmlformats.org/presentationml/2006/main">
-  <p:cSld>
-    <p:spTree>
-      <p:nvGrpSpPr>
-        <p:cNvPr id="1" name=""/>
-        <p:cNvGrpSpPr/>
-        <p:nvPr/>
-      </p:nvGrpSpPr>
-      <p:grpSpPr>
-        <a:xfrm>
-          <a:off x="0" y="0"/>
-          <a:ext cx="0" cy="0"/>
-          <a:chOff x="0" y="0"/>
-          <a:chExt cx="0" cy="0"/>
-        </a:xfrm>
-      </p:grpSpPr>
-      <p:sp>
-        <p:nvSpPr>
-          <p:cNvPr id="4" name="Rectangle 3"/>
-          <p:cNvSpPr/>
-          <p:nvPr/>
-        </p:nvSpPr>
-        <p:spPr>
-          <a:xfrm>
-            <a:off x="3032687" y="716092"/>
-            <a:ext cx="5630052" cy="920027"/>
-          </a:xfrm>
-          <a:prstGeom prst="rect">
-            <a:avLst/>
-          </a:prstGeom>
-          <a:solidFill>
-            <a:srgbClr val="660066"/>
-          </a:solidFill>
-          <a:ln>
-            <a:noFill/>
-          </a:ln>
-        </p:spPr>
-        <p:style>
-          <a:lnRef idx="2">
-            <a:schemeClr val="accent1">
-              <a:shade val="50000"/>
-            </a:schemeClr>
-          </a:lnRef>
-          <a:fillRef idx="1">
-            <a:schemeClr val="accent1"/>
-          </a:fillRef>
-          <a:effectRef idx="0">
-            <a:schemeClr val="accent1"/>
-          </a:effectRef>
-          <a:fontRef idx="minor">
-            <a:schemeClr val="lt1"/>
-          </a:fontRef>
-        </p:style>
-        <p:txBody>
-          <a:bodyPr rtlCol="0" anchor="ctr"/>
-          <a:lstStyle/>
-          <a:p>
-            <a:pPr algn="ctr"/>
-            <a:r>
-              <a:rPr lang="en-US" sz="2000" b="1" dirty="0" smtClean="0">
-                <a:latin typeface="Calibri (Corps)"/>
-                <a:cs typeface="Segoe UI Light" panose="020B0502040204020203" pitchFamily="34" charset="0"/>
-              </a:rPr>
-              <a:t>Two Categories of Types/Values in JavaScript</a:t>
-            </a:r>
-            <a:endParaRPr lang="en-US" sz="2000" b="1" dirty="0">
-              <a:latin typeface="Calibri (Corps)"/>
-              <a:cs typeface="Segoe UI Light" panose="020B0502040204020203" pitchFamily="34" charset="0"/>
-            </a:endParaRPr>
-          </a:p>
-        </p:txBody>
-      </p:sp>
-      <p:sp>
-        <p:nvSpPr>
-          <p:cNvPr id="5" name="ZoneTexte 4"/>
-          <p:cNvSpPr txBox="1"/>
-          <p:nvPr/>
-        </p:nvSpPr>
-        <p:spPr>
-          <a:xfrm>
-            <a:off x="264329" y="0"/>
-            <a:ext cx="6007526" cy="523220"/>
-          </a:xfrm>
-          <a:prstGeom prst="rect">
-            <a:avLst/>
-          </a:prstGeom>
-          <a:noFill/>
-        </p:spPr>
-        <p:txBody>
-          <a:bodyPr wrap="square" rtlCol="0">
-            <a:spAutoFit/>
-          </a:bodyPr>
-          <a:lstStyle/>
-          <a:p>
-            <a:r>
-              <a:rPr lang="en-US" sz="2800" b="1" dirty="0" smtClean="0">
-                <a:ea typeface="Segoe UI Black" panose="020B0A02040204020203" pitchFamily="34" charset="0"/>
-                <a:cs typeface="Segoe UI Semibold" panose="020B0702040204020203" pitchFamily="34" charset="0"/>
-              </a:rPr>
-              <a:t>Primitive vs Reference Values</a:t>
-            </a:r>
-          </a:p>
-        </p:txBody>
-      </p:sp>
-      <p:sp>
-        <p:nvSpPr>
-          <p:cNvPr id="6" name="Rectangle 5"/>
-          <p:cNvSpPr/>
-          <p:nvPr/>
-        </p:nvSpPr>
-        <p:spPr>
-          <a:xfrm>
-            <a:off x="264329" y="2299140"/>
-            <a:ext cx="5085229" cy="743741"/>
-          </a:xfrm>
-          <a:prstGeom prst="rect">
-            <a:avLst/>
-          </a:prstGeom>
-          <a:solidFill>
-            <a:srgbClr val="660066"/>
-          </a:solidFill>
-          <a:ln>
-            <a:noFill/>
-          </a:ln>
-        </p:spPr>
-        <p:style>
-          <a:lnRef idx="2">
-            <a:schemeClr val="accent1">
-              <a:shade val="50000"/>
-            </a:schemeClr>
-          </a:lnRef>
-          <a:fillRef idx="1">
-            <a:schemeClr val="accent1"/>
-          </a:fillRef>
-          <a:effectRef idx="0">
-            <a:schemeClr val="accent1"/>
-          </a:effectRef>
-          <a:fontRef idx="minor">
-            <a:schemeClr val="lt1"/>
-          </a:fontRef>
-        </p:style>
-        <p:txBody>
-          <a:bodyPr rtlCol="0" anchor="ctr"/>
-          <a:lstStyle/>
-          <a:p>
-            <a:pPr algn="ctr"/>
-            <a:r>
-              <a:rPr lang="en-US" sz="2000" b="1" dirty="0" smtClean="0">
-                <a:latin typeface="Calibri (Corps)"/>
-                <a:cs typeface="Segoe UI Light" panose="020B0502040204020203" pitchFamily="34" charset="0"/>
-              </a:rPr>
-              <a:t>Primitive Values</a:t>
-            </a:r>
-            <a:endParaRPr lang="en-US" sz="2000" b="1" dirty="0">
-              <a:latin typeface="Calibri (Corps)"/>
-              <a:cs typeface="Segoe UI Light" panose="020B0502040204020203" pitchFamily="34" charset="0"/>
-            </a:endParaRPr>
-          </a:p>
-        </p:txBody>
-      </p:sp>
-      <p:sp>
-        <p:nvSpPr>
-          <p:cNvPr id="7" name="Rectangle 6"/>
-          <p:cNvSpPr/>
-          <p:nvPr/>
-        </p:nvSpPr>
-        <p:spPr>
-          <a:xfrm>
-            <a:off x="6765877" y="2299140"/>
-            <a:ext cx="5085229" cy="743741"/>
-          </a:xfrm>
-          <a:prstGeom prst="rect">
-            <a:avLst/>
-          </a:prstGeom>
-          <a:solidFill>
-            <a:schemeClr val="accent2"/>
-          </a:solidFill>
-          <a:ln w="19050">
-            <a:solidFill>
-              <a:schemeClr val="tx1"/>
-            </a:solidFill>
-          </a:ln>
-        </p:spPr>
-        <p:style>
-          <a:lnRef idx="2">
-            <a:schemeClr val="accent1">
-              <a:shade val="50000"/>
-            </a:schemeClr>
-          </a:lnRef>
-          <a:fillRef idx="1">
-            <a:schemeClr val="accent1"/>
-          </a:fillRef>
-          <a:effectRef idx="0">
-            <a:schemeClr val="accent1"/>
-          </a:effectRef>
-          <a:fontRef idx="minor">
-            <a:schemeClr val="lt1"/>
-          </a:fontRef>
-        </p:style>
-        <p:txBody>
-          <a:bodyPr rtlCol="0" anchor="ctr"/>
-          <a:lstStyle/>
-          <a:p>
-            <a:pPr algn="ctr"/>
-            <a:r>
-              <a:rPr lang="en-US" sz="2000" dirty="0" smtClean="0">
-                <a:latin typeface="Calibri (Corps)"/>
-                <a:cs typeface="Segoe UI Light" panose="020B0502040204020203" pitchFamily="34" charset="0"/>
-              </a:rPr>
-              <a:t>Reference Values</a:t>
-            </a:r>
-            <a:endParaRPr lang="en-US" sz="2000" dirty="0">
-              <a:latin typeface="Calibri (Corps)"/>
-              <a:cs typeface="Segoe UI Light" panose="020B0502040204020203" pitchFamily="34" charset="0"/>
-            </a:endParaRPr>
-          </a:p>
-        </p:txBody>
-      </p:sp>
-      <p:cxnSp>
-        <p:nvCxnSpPr>
-          <p:cNvPr id="8" name="Connecteur en angle 7"/>
-          <p:cNvCxnSpPr>
-            <a:stCxn id="4" idx="2"/>
-            <a:endCxn id="6" idx="0"/>
-          </p:cNvCxnSpPr>
-          <p:nvPr/>
-        </p:nvCxnSpPr>
-        <p:spPr>
-          <a:xfrm rot="5400000">
-            <a:off x="3995819" y="447245"/>
-            <a:ext cx="663021" cy="3040769"/>
-          </a:xfrm>
-          <a:prstGeom prst="bentConnector3">
-            <a:avLst>
-              <a:gd name="adj1" fmla="val 50000"/>
-            </a:avLst>
-          </a:prstGeom>
-          <a:ln w="57150">
-            <a:solidFill>
-              <a:srgbClr val="321547"/>
-            </a:solidFill>
-            <a:tailEnd type="triangle"/>
-          </a:ln>
-        </p:spPr>
-        <p:style>
-          <a:lnRef idx="1">
-            <a:schemeClr val="accent1"/>
-          </a:lnRef>
-          <a:fillRef idx="0">
-            <a:schemeClr val="accent1"/>
-          </a:fillRef>
-          <a:effectRef idx="0">
-            <a:schemeClr val="accent1"/>
-          </a:effectRef>
-          <a:fontRef idx="minor">
-            <a:schemeClr val="tx1"/>
-          </a:fontRef>
-        </p:style>
-      </p:cxnSp>
-      <p:cxnSp>
-        <p:nvCxnSpPr>
-          <p:cNvPr id="13" name="Connecteur en angle 12"/>
-          <p:cNvCxnSpPr>
-            <a:stCxn id="4" idx="2"/>
-            <a:endCxn id="7" idx="0"/>
-          </p:cNvCxnSpPr>
-          <p:nvPr/>
-        </p:nvCxnSpPr>
-        <p:spPr>
-          <a:xfrm rot="16200000" flipH="1">
-            <a:off x="7246592" y="237239"/>
-            <a:ext cx="663021" cy="3460779"/>
-          </a:xfrm>
-          <a:prstGeom prst="bentConnector3">
-            <a:avLst>
-              <a:gd name="adj1" fmla="val 50000"/>
-            </a:avLst>
-          </a:prstGeom>
-          <a:ln w="57150">
-            <a:solidFill>
-              <a:srgbClr val="321547"/>
-            </a:solidFill>
-            <a:tailEnd type="triangle"/>
-          </a:ln>
-        </p:spPr>
-        <p:style>
-          <a:lnRef idx="1">
-            <a:schemeClr val="accent1"/>
-          </a:lnRef>
-          <a:fillRef idx="0">
-            <a:schemeClr val="accent1"/>
-          </a:fillRef>
-          <a:effectRef idx="0">
-            <a:schemeClr val="accent1"/>
-          </a:effectRef>
-          <a:fontRef idx="minor">
-            <a:schemeClr val="tx1"/>
-          </a:fontRef>
-        </p:style>
-      </p:cxnSp>
-      <p:sp>
-        <p:nvSpPr>
-          <p:cNvPr id="16" name="Rectangle 15"/>
-          <p:cNvSpPr/>
-          <p:nvPr/>
-        </p:nvSpPr>
-        <p:spPr>
-          <a:xfrm>
-            <a:off x="264328" y="3261933"/>
-            <a:ext cx="5085229" cy="887938"/>
-          </a:xfrm>
-          <a:prstGeom prst="rect">
-            <a:avLst/>
-          </a:prstGeom>
-          <a:solidFill>
-            <a:srgbClr val="CC3399">
-              <a:alpha val="29020"/>
-            </a:srgbClr>
-          </a:solidFill>
-          <a:ln w="28575">
-            <a:solidFill>
-              <a:srgbClr val="660066"/>
-            </a:solidFill>
-          </a:ln>
-        </p:spPr>
-        <p:style>
-          <a:lnRef idx="2">
-            <a:schemeClr val="accent1">
-              <a:shade val="50000"/>
-            </a:schemeClr>
-          </a:lnRef>
-          <a:fillRef idx="1">
-            <a:schemeClr val="accent1"/>
-          </a:fillRef>
-          <a:effectRef idx="0">
-            <a:schemeClr val="accent1"/>
-          </a:effectRef>
-          <a:fontRef idx="minor">
-            <a:schemeClr val="lt1"/>
-          </a:fontRef>
-        </p:style>
-        <p:txBody>
-          <a:bodyPr rtlCol="0" anchor="ctr"/>
-          <a:lstStyle/>
-          <a:p>
-            <a:pPr algn="ctr"/>
-            <a:r>
-              <a:rPr lang="en-US" sz="2000" dirty="0" smtClean="0">
-                <a:solidFill>
-                  <a:srgbClr val="660066"/>
-                </a:solidFill>
-                <a:latin typeface="Calibri (Corps)"/>
-                <a:cs typeface="Segoe UI Light" panose="020B0502040204020203" pitchFamily="34" charset="0"/>
-              </a:rPr>
-              <a:t>Strings, Numbers, Booleans, null, undefined, Symbol</a:t>
-            </a:r>
-            <a:endParaRPr lang="en-US" sz="2000" dirty="0">
-              <a:solidFill>
-                <a:srgbClr val="660066"/>
-              </a:solidFill>
-              <a:latin typeface="Calibri (Corps)"/>
-              <a:cs typeface="Segoe UI Light" panose="020B0502040204020203" pitchFamily="34" charset="0"/>
-            </a:endParaRPr>
-          </a:p>
-        </p:txBody>
-      </p:sp>
-      <p:sp>
-        <p:nvSpPr>
-          <p:cNvPr id="17" name="Rectangle 16"/>
-          <p:cNvSpPr/>
-          <p:nvPr/>
-        </p:nvSpPr>
-        <p:spPr>
-          <a:xfrm>
-            <a:off x="264327" y="4374832"/>
-            <a:ext cx="5085229" cy="887938"/>
-          </a:xfrm>
-          <a:prstGeom prst="rect">
-            <a:avLst/>
-          </a:prstGeom>
-          <a:solidFill>
-            <a:srgbClr val="CC3399">
-              <a:alpha val="29020"/>
-            </a:srgbClr>
-          </a:solidFill>
-          <a:ln w="28575">
-            <a:solidFill>
-              <a:srgbClr val="660066"/>
-            </a:solidFill>
-          </a:ln>
-        </p:spPr>
-        <p:style>
-          <a:lnRef idx="2">
-            <a:schemeClr val="accent1">
-              <a:shade val="50000"/>
-            </a:schemeClr>
-          </a:lnRef>
-          <a:fillRef idx="1">
-            <a:schemeClr val="accent1"/>
-          </a:fillRef>
-          <a:effectRef idx="0">
-            <a:schemeClr val="accent1"/>
-          </a:effectRef>
-          <a:fontRef idx="minor">
-            <a:schemeClr val="lt1"/>
-          </a:fontRef>
-        </p:style>
-        <p:txBody>
-          <a:bodyPr rtlCol="0" anchor="ctr"/>
-          <a:lstStyle/>
-          <a:p>
-            <a:pPr algn="ctr"/>
-            <a:r>
-              <a:rPr lang="en-US" sz="2000" dirty="0" smtClean="0">
-                <a:solidFill>
-                  <a:srgbClr val="660066"/>
-                </a:solidFill>
-                <a:latin typeface="Calibri (Corps)"/>
-                <a:cs typeface="Segoe UI Light" panose="020B0502040204020203" pitchFamily="34" charset="0"/>
-              </a:rPr>
-              <a:t>Stored in memory (normally on Stack),</a:t>
-            </a:r>
-          </a:p>
-          <a:p>
-            <a:pPr algn="ctr"/>
-            <a:r>
-              <a:rPr lang="en-US" sz="2000" dirty="0" smtClean="0">
-                <a:solidFill>
-                  <a:srgbClr val="660066"/>
-                </a:solidFill>
-                <a:latin typeface="Calibri (Corps)"/>
-                <a:cs typeface="Segoe UI Light" panose="020B0502040204020203" pitchFamily="34" charset="0"/>
-              </a:rPr>
-              <a:t>Variable stores value itself</a:t>
-            </a:r>
-            <a:endParaRPr lang="en-US" sz="2000" dirty="0">
-              <a:solidFill>
-                <a:srgbClr val="660066"/>
-              </a:solidFill>
-              <a:latin typeface="Calibri (Corps)"/>
-              <a:cs typeface="Segoe UI Light" panose="020B0502040204020203" pitchFamily="34" charset="0"/>
-            </a:endParaRPr>
-          </a:p>
-        </p:txBody>
-      </p:sp>
-      <p:sp>
-        <p:nvSpPr>
-          <p:cNvPr id="18" name="Rectangle 17"/>
-          <p:cNvSpPr/>
-          <p:nvPr/>
-        </p:nvSpPr>
-        <p:spPr>
-          <a:xfrm>
-            <a:off x="264327" y="5481822"/>
-            <a:ext cx="5085229" cy="887938"/>
-          </a:xfrm>
-          <a:prstGeom prst="rect">
-            <a:avLst/>
-          </a:prstGeom>
-          <a:solidFill>
-            <a:srgbClr val="CC3399">
-              <a:alpha val="29020"/>
-            </a:srgbClr>
-          </a:solidFill>
-          <a:ln w="28575">
-            <a:solidFill>
-              <a:srgbClr val="660066"/>
-            </a:solidFill>
-          </a:ln>
-        </p:spPr>
-        <p:style>
-          <a:lnRef idx="2">
-            <a:schemeClr val="accent1">
-              <a:shade val="50000"/>
-            </a:schemeClr>
-          </a:lnRef>
-          <a:fillRef idx="1">
-            <a:schemeClr val="accent1"/>
-          </a:fillRef>
-          <a:effectRef idx="0">
-            <a:schemeClr val="accent1"/>
-          </a:effectRef>
-          <a:fontRef idx="minor">
-            <a:schemeClr val="lt1"/>
-          </a:fontRef>
-        </p:style>
-        <p:txBody>
-          <a:bodyPr rtlCol="0" anchor="ctr"/>
-          <a:lstStyle/>
-          <a:p>
-            <a:pPr algn="ctr"/>
-            <a:r>
-              <a:rPr lang="en-US" sz="2000" dirty="0" smtClean="0">
-                <a:solidFill>
-                  <a:srgbClr val="660066"/>
-                </a:solidFill>
-                <a:latin typeface="Calibri (Corps)"/>
-                <a:cs typeface="Segoe UI Light" panose="020B0502040204020203" pitchFamily="34" charset="0"/>
-              </a:rPr>
-              <a:t>Copying a variable (assign to different variable) </a:t>
-            </a:r>
-            <a:r>
-              <a:rPr lang="en-US" sz="2000" b="1" dirty="0" smtClean="0">
-                <a:solidFill>
-                  <a:srgbClr val="660066"/>
-                </a:solidFill>
-                <a:latin typeface="Calibri (Corps)"/>
-                <a:cs typeface="Segoe UI Light" panose="020B0502040204020203" pitchFamily="34" charset="0"/>
-              </a:rPr>
-              <a:t>copies the value</a:t>
-            </a:r>
-            <a:endParaRPr lang="en-US" sz="2000" b="1" dirty="0">
-              <a:solidFill>
-                <a:srgbClr val="660066"/>
-              </a:solidFill>
-              <a:latin typeface="Calibri (Corps)"/>
-              <a:cs typeface="Segoe UI Light" panose="020B0502040204020203" pitchFamily="34" charset="0"/>
-            </a:endParaRPr>
-          </a:p>
-        </p:txBody>
-      </p:sp>
-      <p:sp>
-        <p:nvSpPr>
-          <p:cNvPr id="19" name="Rectangle 18"/>
-          <p:cNvSpPr/>
-          <p:nvPr/>
-        </p:nvSpPr>
-        <p:spPr>
-          <a:xfrm>
-            <a:off x="6765876" y="3261933"/>
-            <a:ext cx="5085229" cy="887938"/>
-          </a:xfrm>
-          <a:prstGeom prst="rect">
-            <a:avLst/>
-          </a:prstGeom>
-          <a:solidFill>
-            <a:srgbClr val="ED7D31">
-              <a:alpha val="29020"/>
-            </a:srgbClr>
-          </a:solidFill>
-          <a:ln w="28575">
-            <a:solidFill>
-              <a:srgbClr val="ED7D31"/>
-            </a:solidFill>
-          </a:ln>
-        </p:spPr>
-        <p:style>
-          <a:lnRef idx="2">
-            <a:schemeClr val="accent2"/>
-          </a:lnRef>
-          <a:fillRef idx="1">
-            <a:schemeClr val="lt1"/>
-          </a:fillRef>
-          <a:effectRef idx="0">
-            <a:schemeClr val="accent2"/>
-          </a:effectRef>
-          <a:fontRef idx="minor">
-            <a:schemeClr val="dk1"/>
-          </a:fontRef>
-        </p:style>
-        <p:txBody>
-          <a:bodyPr rtlCol="0" anchor="ctr"/>
-          <a:lstStyle/>
-          <a:p>
-            <a:pPr algn="ctr"/>
-            <a:r>
-              <a:rPr lang="en-US" sz="2000" dirty="0" smtClean="0">
-                <a:solidFill>
-                  <a:schemeClr val="accent2"/>
-                </a:solidFill>
-              </a:rPr>
-              <a:t>All other objects (“more expensive to create”)</a:t>
-            </a:r>
-            <a:endParaRPr lang="en-US" sz="2000" dirty="0">
-              <a:solidFill>
-                <a:schemeClr val="accent2"/>
-              </a:solidFill>
-            </a:endParaRPr>
-          </a:p>
-        </p:txBody>
-      </p:sp>
-      <p:sp>
-        <p:nvSpPr>
-          <p:cNvPr id="20" name="Rectangle 19"/>
-          <p:cNvSpPr/>
-          <p:nvPr/>
-        </p:nvSpPr>
-        <p:spPr>
-          <a:xfrm>
-            <a:off x="6765876" y="4374832"/>
-            <a:ext cx="5085229" cy="887938"/>
-          </a:xfrm>
-          <a:prstGeom prst="rect">
-            <a:avLst/>
-          </a:prstGeom>
-          <a:solidFill>
-            <a:srgbClr val="ED7D31">
-              <a:alpha val="29020"/>
-            </a:srgbClr>
-          </a:solidFill>
-          <a:ln w="28575">
-            <a:solidFill>
-              <a:srgbClr val="ED7D31"/>
-            </a:solidFill>
-          </a:ln>
-        </p:spPr>
-        <p:style>
-          <a:lnRef idx="2">
-            <a:schemeClr val="accent2"/>
-          </a:lnRef>
-          <a:fillRef idx="1">
-            <a:schemeClr val="lt1"/>
-          </a:fillRef>
-          <a:effectRef idx="0">
-            <a:schemeClr val="accent2"/>
-          </a:effectRef>
-          <a:fontRef idx="minor">
-            <a:schemeClr val="dk1"/>
-          </a:fontRef>
-        </p:style>
-        <p:txBody>
-          <a:bodyPr rtlCol="0" anchor="ctr"/>
-          <a:lstStyle/>
-          <a:p>
-            <a:pPr algn="ctr"/>
-            <a:r>
-              <a:rPr lang="en-US" sz="2000" dirty="0" smtClean="0">
-                <a:solidFill>
-                  <a:schemeClr val="accent2"/>
-                </a:solidFill>
-              </a:rPr>
-              <a:t>Stored in memory (Heap), variable stores a pointer (address) to location in memory</a:t>
-            </a:r>
-            <a:endParaRPr lang="en-US" sz="2000" dirty="0">
-              <a:solidFill>
-                <a:schemeClr val="accent2"/>
-              </a:solidFill>
-            </a:endParaRPr>
-          </a:p>
-        </p:txBody>
-      </p:sp>
-      <p:sp>
-        <p:nvSpPr>
-          <p:cNvPr id="21" name="Rectangle 20"/>
-          <p:cNvSpPr/>
-          <p:nvPr/>
-        </p:nvSpPr>
-        <p:spPr>
-          <a:xfrm>
-            <a:off x="6765876" y="5481822"/>
-            <a:ext cx="5085229" cy="887938"/>
-          </a:xfrm>
-          <a:prstGeom prst="rect">
-            <a:avLst/>
-          </a:prstGeom>
-          <a:solidFill>
-            <a:srgbClr val="ED7D31">
-              <a:alpha val="29020"/>
-            </a:srgbClr>
-          </a:solidFill>
-          <a:ln w="28575">
-            <a:solidFill>
-              <a:srgbClr val="ED7D31"/>
-            </a:solidFill>
-          </a:ln>
-        </p:spPr>
-        <p:style>
-          <a:lnRef idx="2">
-            <a:schemeClr val="accent2"/>
-          </a:lnRef>
-          <a:fillRef idx="1">
-            <a:schemeClr val="lt1"/>
-          </a:fillRef>
-          <a:effectRef idx="0">
-            <a:schemeClr val="accent2"/>
-          </a:effectRef>
-          <a:fontRef idx="minor">
-            <a:schemeClr val="dk1"/>
-          </a:fontRef>
-        </p:style>
-        <p:txBody>
-          <a:bodyPr rtlCol="0" anchor="ctr"/>
-          <a:lstStyle/>
-          <a:p>
-            <a:pPr algn="ctr"/>
-            <a:r>
-              <a:rPr lang="en-US" sz="2000" dirty="0" smtClean="0">
-                <a:solidFill>
-                  <a:schemeClr val="accent2"/>
-                </a:solidFill>
-              </a:rPr>
-              <a:t>Copying a variable (assign to different variable) </a:t>
-            </a:r>
-            <a:r>
-              <a:rPr lang="en-US" sz="2000" b="1" dirty="0" smtClean="0">
-                <a:solidFill>
-                  <a:schemeClr val="accent2"/>
-                </a:solidFill>
-              </a:rPr>
-              <a:t>copies the pointer/reference</a:t>
-            </a:r>
-            <a:endParaRPr lang="en-US" sz="2000" b="1" dirty="0">
-              <a:solidFill>
-                <a:schemeClr val="accent2"/>
-              </a:solidFill>
-            </a:endParaRPr>
-          </a:p>
-        </p:txBody>
-      </p:sp>
-    </p:spTree>
-    <p:extLst>
-      <p:ext uri="{BB962C8B-B14F-4D97-AF65-F5344CB8AC3E}">
-        <p14:creationId xmlns:p14="http://schemas.microsoft.com/office/powerpoint/2010/main" val="911258773"/>
-      </p:ext>
-    </p:extLst>
-  </p:cSld>
-  <p:clrMapOvr>
-    <a:masterClrMapping/>
-  </p:clrMapOvr>
-</p:sld>
-</file>
-
 <file path=ppt/slides/slide9.xml><?xml version="1.0" encoding="utf-8"?>
 <p:sld xmlns:a="http://schemas.openxmlformats.org/drawingml/2006/main" xmlns:r="http://schemas.openxmlformats.org/officeDocument/2006/relationships" xmlns:p="http://schemas.openxmlformats.org/presentationml/2006/main">
   <p:cSld>
@@ -8588,534 +9364,14 @@
       </p:grpSpPr>
       <p:sp>
         <p:nvSpPr>
-          <p:cNvPr id="4" name="ZoneTexte 3"/>
-          <p:cNvSpPr txBox="1"/>
-          <p:nvPr/>
-        </p:nvSpPr>
-        <p:spPr>
-          <a:xfrm>
-            <a:off x="264329" y="0"/>
-            <a:ext cx="6007526" cy="523220"/>
-          </a:xfrm>
-          <a:prstGeom prst="rect">
-            <a:avLst/>
-          </a:prstGeom>
-          <a:noFill/>
-        </p:spPr>
-        <p:txBody>
-          <a:bodyPr wrap="square" rtlCol="0">
-            <a:spAutoFit/>
-          </a:bodyPr>
-          <a:lstStyle/>
-          <a:p>
-            <a:r>
-              <a:rPr lang="en-US" sz="2800" b="1" dirty="0" smtClean="0">
-                <a:ea typeface="Segoe UI Black" panose="020B0A02040204020203" pitchFamily="34" charset="0"/>
-                <a:cs typeface="Segoe UI Semibold" panose="020B0702040204020203" pitchFamily="34" charset="0"/>
-              </a:rPr>
-              <a:t>Garbage Collection</a:t>
-            </a:r>
-          </a:p>
-        </p:txBody>
-      </p:sp>
-      <p:sp>
-        <p:nvSpPr>
-          <p:cNvPr id="5" name="Rectangle 4"/>
+          <p:cNvPr id="4" name="Rectangle 3"/>
           <p:cNvSpPr/>
           <p:nvPr/>
         </p:nvSpPr>
         <p:spPr>
           <a:xfrm>
-            <a:off x="3268093" y="458311"/>
-            <a:ext cx="3638034" cy="692071"/>
-          </a:xfrm>
-          <a:prstGeom prst="rect">
-            <a:avLst/>
-          </a:prstGeom>
-          <a:solidFill>
-            <a:srgbClr val="FCF600"/>
-          </a:solidFill>
-          <a:ln w="28575">
-            <a:solidFill>
-              <a:schemeClr val="tx1"/>
-            </a:solidFill>
-          </a:ln>
-        </p:spPr>
-        <p:style>
-          <a:lnRef idx="2">
-            <a:schemeClr val="accent1">
-              <a:shade val="50000"/>
-            </a:schemeClr>
-          </a:lnRef>
-          <a:fillRef idx="1">
-            <a:schemeClr val="accent1"/>
-          </a:fillRef>
-          <a:effectRef idx="0">
-            <a:schemeClr val="accent1"/>
-          </a:effectRef>
-          <a:fontRef idx="minor">
-            <a:schemeClr val="lt1"/>
-          </a:fontRef>
-        </p:style>
-        <p:txBody>
-          <a:bodyPr rtlCol="0" anchor="ctr"/>
-          <a:lstStyle/>
-          <a:p>
-            <a:pPr algn="ctr"/>
-            <a:r>
-              <a:rPr lang="en-US" sz="2000" dirty="0" smtClean="0">
-                <a:solidFill>
-                  <a:sysClr val="windowText" lastClr="000000"/>
-                </a:solidFill>
-                <a:latin typeface="Calibri (Corps)"/>
-                <a:cs typeface="Segoe UI Light" panose="020B0502040204020203" pitchFamily="34" charset="0"/>
-              </a:rPr>
-              <a:t>How is this memory managed?</a:t>
-            </a:r>
-            <a:endParaRPr lang="en-US" sz="2000" dirty="0">
-              <a:solidFill>
-                <a:sysClr val="windowText" lastClr="000000"/>
-              </a:solidFill>
-              <a:latin typeface="Calibri (Corps)"/>
-              <a:cs typeface="Segoe UI Light" panose="020B0502040204020203" pitchFamily="34" charset="0"/>
-            </a:endParaRPr>
-          </a:p>
-        </p:txBody>
-      </p:sp>
-      <p:grpSp>
-        <p:nvGrpSpPr>
-          <p:cNvPr id="6" name="Groupe 5"/>
-          <p:cNvGrpSpPr/>
-          <p:nvPr/>
-        </p:nvGrpSpPr>
-        <p:grpSpPr>
-          <a:xfrm>
-            <a:off x="1324993" y="2680798"/>
-            <a:ext cx="3621504" cy="3584439"/>
-            <a:chOff x="1780673" y="2805049"/>
-            <a:chExt cx="3621504" cy="3584439"/>
-          </a:xfrm>
-        </p:grpSpPr>
-        <p:sp>
-          <p:nvSpPr>
-            <p:cNvPr id="7" name="Rectangle 6"/>
-            <p:cNvSpPr/>
-            <p:nvPr/>
-          </p:nvSpPr>
-          <p:spPr>
-            <a:xfrm>
-              <a:off x="1780673" y="2805049"/>
-              <a:ext cx="3621504" cy="2723856"/>
-            </a:xfrm>
-            <a:prstGeom prst="rect">
-              <a:avLst/>
-            </a:prstGeom>
-            <a:solidFill>
-              <a:srgbClr val="ED7D31">
-                <a:alpha val="29020"/>
-              </a:srgbClr>
-            </a:solidFill>
-            <a:ln w="28575">
-              <a:solidFill>
-                <a:schemeClr val="accent2">
-                  <a:lumMod val="60000"/>
-                  <a:lumOff val="40000"/>
-                </a:schemeClr>
-              </a:solidFill>
-            </a:ln>
-          </p:spPr>
-          <p:style>
-            <a:lnRef idx="2">
-              <a:schemeClr val="accent2"/>
-            </a:lnRef>
-            <a:fillRef idx="1">
-              <a:schemeClr val="lt1"/>
-            </a:fillRef>
-            <a:effectRef idx="0">
-              <a:schemeClr val="accent2"/>
-            </a:effectRef>
-            <a:fontRef idx="minor">
-              <a:schemeClr val="dk1"/>
-            </a:fontRef>
-          </p:style>
-          <p:txBody>
-            <a:bodyPr rtlCol="0" anchor="ctr"/>
-            <a:lstStyle/>
-            <a:p>
-              <a:pPr algn="ctr"/>
-              <a:endParaRPr lang="en-US" sz="2400" dirty="0">
-                <a:solidFill>
-                  <a:schemeClr val="accent2"/>
-                </a:solidFill>
-              </a:endParaRPr>
-            </a:p>
-          </p:txBody>
-        </p:sp>
-        <p:sp>
-          <p:nvSpPr>
-            <p:cNvPr id="8" name="Rectangle 7"/>
-            <p:cNvSpPr/>
-            <p:nvPr/>
-          </p:nvSpPr>
-          <p:spPr>
-            <a:xfrm>
-              <a:off x="1780673" y="5528905"/>
-              <a:ext cx="3621504" cy="860583"/>
-            </a:xfrm>
-            <a:prstGeom prst="rect">
-              <a:avLst/>
-            </a:prstGeom>
-            <a:solidFill>
-              <a:schemeClr val="accent2">
-                <a:lumMod val="60000"/>
-                <a:lumOff val="40000"/>
-              </a:schemeClr>
-            </a:solidFill>
-            <a:ln w="19050">
-              <a:solidFill>
-                <a:schemeClr val="accent2">
-                  <a:lumMod val="60000"/>
-                  <a:lumOff val="40000"/>
-                </a:schemeClr>
-              </a:solidFill>
-            </a:ln>
-          </p:spPr>
-          <p:style>
-            <a:lnRef idx="2">
-              <a:schemeClr val="accent1">
-                <a:shade val="50000"/>
-              </a:schemeClr>
-            </a:lnRef>
-            <a:fillRef idx="1">
-              <a:schemeClr val="accent1"/>
-            </a:fillRef>
-            <a:effectRef idx="0">
-              <a:schemeClr val="accent1"/>
-            </a:effectRef>
-            <a:fontRef idx="minor">
-              <a:schemeClr val="lt1"/>
-            </a:fontRef>
-          </p:style>
-          <p:txBody>
-            <a:bodyPr rtlCol="0" anchor="ctr"/>
-            <a:lstStyle/>
-            <a:p>
-              <a:pPr algn="ctr"/>
-              <a:r>
-                <a:rPr lang="en-US" sz="2000" dirty="0" smtClean="0">
-                  <a:latin typeface="Calibri (Corps)"/>
-                  <a:cs typeface="Segoe UI Light" panose="020B0502040204020203" pitchFamily="34" charset="0"/>
-                </a:rPr>
-                <a:t>Heap</a:t>
-              </a:r>
-              <a:endParaRPr lang="en-US" sz="2000" dirty="0">
-                <a:latin typeface="Calibri (Corps)"/>
-                <a:cs typeface="Segoe UI Light" panose="020B0502040204020203" pitchFamily="34" charset="0"/>
-              </a:endParaRPr>
-            </a:p>
-          </p:txBody>
-        </p:sp>
-        <p:sp>
-          <p:nvSpPr>
-            <p:cNvPr id="9" name="Rectangle 8"/>
-            <p:cNvSpPr/>
-            <p:nvPr/>
-          </p:nvSpPr>
-          <p:spPr>
-            <a:xfrm>
-              <a:off x="2056613" y="2986747"/>
-              <a:ext cx="785456" cy="736323"/>
-            </a:xfrm>
-            <a:prstGeom prst="rect">
-              <a:avLst/>
-            </a:prstGeom>
-            <a:solidFill>
-              <a:schemeClr val="accent2">
-                <a:lumMod val="60000"/>
-                <a:lumOff val="40000"/>
-              </a:schemeClr>
-            </a:solidFill>
-            <a:ln w="19050">
-              <a:noFill/>
-            </a:ln>
-          </p:spPr>
-          <p:style>
-            <a:lnRef idx="2">
-              <a:schemeClr val="accent1">
-                <a:shade val="50000"/>
-              </a:schemeClr>
-            </a:lnRef>
-            <a:fillRef idx="1">
-              <a:schemeClr val="accent1"/>
-            </a:fillRef>
-            <a:effectRef idx="0">
-              <a:schemeClr val="accent1"/>
-            </a:effectRef>
-            <a:fontRef idx="minor">
-              <a:schemeClr val="lt1"/>
-            </a:fontRef>
-          </p:style>
-          <p:txBody>
-            <a:bodyPr rtlCol="0" anchor="ctr"/>
-            <a:lstStyle/>
-            <a:p>
-              <a:pPr algn="ctr"/>
-              <a:r>
-                <a:rPr lang="en-US" sz="2000" dirty="0" smtClean="0">
-                  <a:latin typeface="Calibri (Corps)"/>
-                  <a:cs typeface="Segoe UI Light" panose="020B0502040204020203" pitchFamily="34" charset="0"/>
-                </a:rPr>
-                <a:t>A</a:t>
-              </a:r>
-              <a:endParaRPr lang="en-US" sz="2000" dirty="0">
-                <a:latin typeface="Calibri (Corps)"/>
-                <a:cs typeface="Segoe UI Light" panose="020B0502040204020203" pitchFamily="34" charset="0"/>
-              </a:endParaRPr>
-            </a:p>
-          </p:txBody>
-        </p:sp>
-        <p:sp>
-          <p:nvSpPr>
-            <p:cNvPr id="10" name="Rectangle 9"/>
-            <p:cNvSpPr/>
-            <p:nvPr/>
-          </p:nvSpPr>
-          <p:spPr>
-            <a:xfrm>
-              <a:off x="3288942" y="3723070"/>
-              <a:ext cx="785456" cy="736323"/>
-            </a:xfrm>
-            <a:prstGeom prst="rect">
-              <a:avLst/>
-            </a:prstGeom>
-            <a:solidFill>
-              <a:schemeClr val="accent2">
-                <a:lumMod val="60000"/>
-                <a:lumOff val="40000"/>
-              </a:schemeClr>
-            </a:solidFill>
-            <a:ln w="19050">
-              <a:noFill/>
-            </a:ln>
-          </p:spPr>
-          <p:style>
-            <a:lnRef idx="2">
-              <a:schemeClr val="accent1">
-                <a:shade val="50000"/>
-              </a:schemeClr>
-            </a:lnRef>
-            <a:fillRef idx="1">
-              <a:schemeClr val="accent1"/>
-            </a:fillRef>
-            <a:effectRef idx="0">
-              <a:schemeClr val="accent1"/>
-            </a:effectRef>
-            <a:fontRef idx="minor">
-              <a:schemeClr val="lt1"/>
-            </a:fontRef>
-          </p:style>
-          <p:txBody>
-            <a:bodyPr rtlCol="0" anchor="ctr"/>
-            <a:lstStyle/>
-            <a:p>
-              <a:pPr algn="ctr"/>
-              <a:r>
-                <a:rPr lang="en-US" sz="2000" dirty="0" smtClean="0">
-                  <a:latin typeface="Calibri (Corps)"/>
-                  <a:cs typeface="Segoe UI Light" panose="020B0502040204020203" pitchFamily="34" charset="0"/>
-                </a:rPr>
-                <a:t>B</a:t>
-              </a:r>
-              <a:endParaRPr lang="en-US" sz="2000" dirty="0">
-                <a:latin typeface="Calibri (Corps)"/>
-                <a:cs typeface="Segoe UI Light" panose="020B0502040204020203" pitchFamily="34" charset="0"/>
-              </a:endParaRPr>
-            </a:p>
-          </p:txBody>
-        </p:sp>
-        <p:sp>
-          <p:nvSpPr>
-            <p:cNvPr id="11" name="Rectangle 10"/>
-            <p:cNvSpPr/>
-            <p:nvPr/>
-          </p:nvSpPr>
-          <p:spPr>
-            <a:xfrm>
-              <a:off x="2318330" y="4625988"/>
-              <a:ext cx="785456" cy="736323"/>
-            </a:xfrm>
-            <a:prstGeom prst="rect">
-              <a:avLst/>
-            </a:prstGeom>
-            <a:solidFill>
-              <a:schemeClr val="accent2">
-                <a:lumMod val="60000"/>
-                <a:lumOff val="40000"/>
-              </a:schemeClr>
-            </a:solidFill>
-            <a:ln w="19050">
-              <a:noFill/>
-            </a:ln>
-          </p:spPr>
-          <p:style>
-            <a:lnRef idx="2">
-              <a:schemeClr val="accent1">
-                <a:shade val="50000"/>
-              </a:schemeClr>
-            </a:lnRef>
-            <a:fillRef idx="1">
-              <a:schemeClr val="accent1"/>
-            </a:fillRef>
-            <a:effectRef idx="0">
-              <a:schemeClr val="accent1"/>
-            </a:effectRef>
-            <a:fontRef idx="minor">
-              <a:schemeClr val="lt1"/>
-            </a:fontRef>
-          </p:style>
-          <p:txBody>
-            <a:bodyPr rtlCol="0" anchor="ctr"/>
-            <a:lstStyle/>
-            <a:p>
-              <a:pPr algn="ctr"/>
-              <a:r>
-                <a:rPr lang="en-US" sz="2000" dirty="0" smtClean="0">
-                  <a:latin typeface="Calibri (Corps)"/>
-                  <a:cs typeface="Segoe UI Light" panose="020B0502040204020203" pitchFamily="34" charset="0"/>
-                </a:rPr>
-                <a:t>C</a:t>
-              </a:r>
-              <a:endParaRPr lang="en-US" sz="2000" dirty="0">
-                <a:latin typeface="Calibri (Corps)"/>
-                <a:cs typeface="Segoe UI Light" panose="020B0502040204020203" pitchFamily="34" charset="0"/>
-              </a:endParaRPr>
-            </a:p>
-          </p:txBody>
-        </p:sp>
-        <p:sp>
-          <p:nvSpPr>
-            <p:cNvPr id="12" name="Rectangle 11"/>
-            <p:cNvSpPr/>
-            <p:nvPr/>
-          </p:nvSpPr>
-          <p:spPr>
-            <a:xfrm>
-              <a:off x="4397278" y="4386628"/>
-              <a:ext cx="785456" cy="736323"/>
-            </a:xfrm>
-            <a:prstGeom prst="rect">
-              <a:avLst/>
-            </a:prstGeom>
-            <a:solidFill>
-              <a:schemeClr val="accent2">
-                <a:lumMod val="60000"/>
-                <a:lumOff val="40000"/>
-              </a:schemeClr>
-            </a:solidFill>
-            <a:ln w="19050">
-              <a:noFill/>
-            </a:ln>
-          </p:spPr>
-          <p:style>
-            <a:lnRef idx="2">
-              <a:schemeClr val="accent1">
-                <a:shade val="50000"/>
-              </a:schemeClr>
-            </a:lnRef>
-            <a:fillRef idx="1">
-              <a:schemeClr val="accent1"/>
-            </a:fillRef>
-            <a:effectRef idx="0">
-              <a:schemeClr val="accent1"/>
-            </a:effectRef>
-            <a:fontRef idx="minor">
-              <a:schemeClr val="lt1"/>
-            </a:fontRef>
-          </p:style>
-          <p:txBody>
-            <a:bodyPr rtlCol="0" anchor="ctr"/>
-            <a:lstStyle/>
-            <a:p>
-              <a:pPr algn="ctr"/>
-              <a:r>
-                <a:rPr lang="en-US" sz="2000" dirty="0" smtClean="0">
-                  <a:latin typeface="Calibri (Corps)"/>
-                  <a:cs typeface="Segoe UI Light" panose="020B0502040204020203" pitchFamily="34" charset="0"/>
-                </a:rPr>
-                <a:t>D</a:t>
-              </a:r>
-              <a:endParaRPr lang="en-US" sz="2000" dirty="0">
-                <a:latin typeface="Calibri (Corps)"/>
-                <a:cs typeface="Segoe UI Light" panose="020B0502040204020203" pitchFamily="34" charset="0"/>
-              </a:endParaRPr>
-            </a:p>
-          </p:txBody>
-        </p:sp>
-      </p:grpSp>
-      <p:sp>
-        <p:nvSpPr>
-          <p:cNvPr id="13" name="Flèche droite 12"/>
-          <p:cNvSpPr/>
-          <p:nvPr/>
-        </p:nvSpPr>
-        <p:spPr>
-          <a:xfrm rot="6646972">
-            <a:off x="3049141" y="1675046"/>
-            <a:ext cx="1457067" cy="746614"/>
-          </a:xfrm>
-          <a:prstGeom prst="rightArrow">
-            <a:avLst/>
-          </a:prstGeom>
-          <a:solidFill>
-            <a:srgbClr val="FCF600"/>
-          </a:solidFill>
-          <a:ln w="28575">
-            <a:solidFill>
-              <a:schemeClr val="tx1"/>
-            </a:solidFill>
-          </a:ln>
-        </p:spPr>
-        <p:style>
-          <a:lnRef idx="2">
-            <a:schemeClr val="accent1">
-              <a:shade val="50000"/>
-            </a:schemeClr>
-          </a:lnRef>
-          <a:fillRef idx="1">
-            <a:schemeClr val="accent1"/>
-          </a:fillRef>
-          <a:effectRef idx="0">
-            <a:schemeClr val="accent1"/>
-          </a:effectRef>
-          <a:fontRef idx="minor">
-            <a:schemeClr val="lt1"/>
-          </a:fontRef>
-        </p:style>
-        <p:txBody>
-          <a:bodyPr rtlCol="0" anchor="ctr"/>
-          <a:lstStyle/>
-          <a:p>
-            <a:pPr algn="ctr"/>
-            <a:endParaRPr lang="en-US" sz="2000" dirty="0">
-              <a:solidFill>
-                <a:sysClr val="windowText" lastClr="000000"/>
-              </a:solidFill>
-              <a:latin typeface="Calibri (Corps)"/>
-              <a:cs typeface="Segoe UI Light" panose="020B0502040204020203" pitchFamily="34" charset="0"/>
-            </a:endParaRPr>
-          </a:p>
-        </p:txBody>
-      </p:sp>
-      <p:sp>
-        <p:nvSpPr>
-          <p:cNvPr id="14" name="Rectangle 13"/>
-          <p:cNvSpPr/>
-          <p:nvPr/>
-        </p:nvSpPr>
-        <p:spPr>
-          <a:xfrm>
-            <a:off x="6906127" y="2680798"/>
-            <a:ext cx="4041882" cy="651949"/>
+            <a:off x="3032687" y="716092"/>
+            <a:ext cx="5630052" cy="920027"/>
           </a:xfrm>
           <a:prstGeom prst="rect">
             <a:avLst/>
@@ -9153,7 +9409,7 @@
                 <a:latin typeface="Calibri (Corps)"/>
                 <a:cs typeface="Segoe UI Light" panose="020B0502040204020203" pitchFamily="34" charset="0"/>
               </a:rPr>
-              <a:t>(V8’s) Garbage Collector</a:t>
+              <a:t>Two Categories of Types/Values in JavaScript</a:t>
             </a:r>
             <a:endParaRPr lang="en-US" sz="2000" b="1" dirty="0">
               <a:latin typeface="Calibri (Corps)"/>
@@ -9164,14 +9420,242 @@
       </p:sp>
       <p:sp>
         <p:nvSpPr>
-          <p:cNvPr id="15" name="Rectangle 14"/>
+          <p:cNvPr id="5" name="ZoneTexte 4"/>
+          <p:cNvSpPr txBox="1"/>
+          <p:nvPr/>
+        </p:nvSpPr>
+        <p:spPr>
+          <a:xfrm>
+            <a:off x="264329" y="0"/>
+            <a:ext cx="6007526" cy="523220"/>
+          </a:xfrm>
+          <a:prstGeom prst="rect">
+            <a:avLst/>
+          </a:prstGeom>
+          <a:noFill/>
+        </p:spPr>
+        <p:txBody>
+          <a:bodyPr wrap="square" rtlCol="0">
+            <a:spAutoFit/>
+          </a:bodyPr>
+          <a:lstStyle/>
+          <a:p>
+            <a:r>
+              <a:rPr lang="en-US" sz="2800" b="1" dirty="0" smtClean="0">
+                <a:ea typeface="Segoe UI Black" panose="020B0A02040204020203" pitchFamily="34" charset="0"/>
+                <a:cs typeface="Segoe UI Semibold" panose="020B0702040204020203" pitchFamily="34" charset="0"/>
+              </a:rPr>
+              <a:t>Primitive vs Reference Values</a:t>
+            </a:r>
+          </a:p>
+        </p:txBody>
+      </p:sp>
+      <p:sp>
+        <p:nvSpPr>
+          <p:cNvPr id="6" name="Rectangle 5"/>
           <p:cNvSpPr/>
           <p:nvPr/>
         </p:nvSpPr>
         <p:spPr>
           <a:xfrm>
-            <a:off x="6906127" y="3447204"/>
-            <a:ext cx="4041882" cy="1790856"/>
+            <a:off x="264329" y="2299140"/>
+            <a:ext cx="5085229" cy="743741"/>
+          </a:xfrm>
+          <a:prstGeom prst="rect">
+            <a:avLst/>
+          </a:prstGeom>
+          <a:solidFill>
+            <a:srgbClr val="660066"/>
+          </a:solidFill>
+          <a:ln>
+            <a:noFill/>
+          </a:ln>
+        </p:spPr>
+        <p:style>
+          <a:lnRef idx="2">
+            <a:schemeClr val="accent1">
+              <a:shade val="50000"/>
+            </a:schemeClr>
+          </a:lnRef>
+          <a:fillRef idx="1">
+            <a:schemeClr val="accent1"/>
+          </a:fillRef>
+          <a:effectRef idx="0">
+            <a:schemeClr val="accent1"/>
+          </a:effectRef>
+          <a:fontRef idx="minor">
+            <a:schemeClr val="lt1"/>
+          </a:fontRef>
+        </p:style>
+        <p:txBody>
+          <a:bodyPr rtlCol="0" anchor="ctr"/>
+          <a:lstStyle/>
+          <a:p>
+            <a:pPr algn="ctr"/>
+            <a:r>
+              <a:rPr lang="en-US" sz="2000" b="1" dirty="0" smtClean="0">
+                <a:latin typeface="Calibri (Corps)"/>
+                <a:cs typeface="Segoe UI Light" panose="020B0502040204020203" pitchFamily="34" charset="0"/>
+              </a:rPr>
+              <a:t>Primitive Values</a:t>
+            </a:r>
+            <a:endParaRPr lang="en-US" sz="2000" b="1" dirty="0">
+              <a:latin typeface="Calibri (Corps)"/>
+              <a:cs typeface="Segoe UI Light" panose="020B0502040204020203" pitchFamily="34" charset="0"/>
+            </a:endParaRPr>
+          </a:p>
+        </p:txBody>
+      </p:sp>
+      <p:sp>
+        <p:nvSpPr>
+          <p:cNvPr id="7" name="Rectangle 6"/>
+          <p:cNvSpPr/>
+          <p:nvPr/>
+        </p:nvSpPr>
+        <p:spPr>
+          <a:xfrm>
+            <a:off x="6765877" y="2299140"/>
+            <a:ext cx="5085229" cy="743741"/>
+          </a:xfrm>
+          <a:prstGeom prst="rect">
+            <a:avLst/>
+          </a:prstGeom>
+          <a:solidFill>
+            <a:schemeClr val="accent2"/>
+          </a:solidFill>
+          <a:ln w="19050">
+            <a:solidFill>
+              <a:schemeClr val="tx1"/>
+            </a:solidFill>
+          </a:ln>
+        </p:spPr>
+        <p:style>
+          <a:lnRef idx="2">
+            <a:schemeClr val="accent1">
+              <a:shade val="50000"/>
+            </a:schemeClr>
+          </a:lnRef>
+          <a:fillRef idx="1">
+            <a:schemeClr val="accent1"/>
+          </a:fillRef>
+          <a:effectRef idx="0">
+            <a:schemeClr val="accent1"/>
+          </a:effectRef>
+          <a:fontRef idx="minor">
+            <a:schemeClr val="lt1"/>
+          </a:fontRef>
+        </p:style>
+        <p:txBody>
+          <a:bodyPr rtlCol="0" anchor="ctr"/>
+          <a:lstStyle/>
+          <a:p>
+            <a:pPr algn="ctr"/>
+            <a:r>
+              <a:rPr lang="en-US" sz="2000" dirty="0" smtClean="0">
+                <a:latin typeface="Calibri (Corps)"/>
+                <a:cs typeface="Segoe UI Light" panose="020B0502040204020203" pitchFamily="34" charset="0"/>
+              </a:rPr>
+              <a:t>Reference Values</a:t>
+            </a:r>
+            <a:endParaRPr lang="en-US" sz="2000" dirty="0">
+              <a:latin typeface="Calibri (Corps)"/>
+              <a:cs typeface="Segoe UI Light" panose="020B0502040204020203" pitchFamily="34" charset="0"/>
+            </a:endParaRPr>
+          </a:p>
+        </p:txBody>
+      </p:sp>
+      <p:cxnSp>
+        <p:nvCxnSpPr>
+          <p:cNvPr id="8" name="Connecteur en angle 7"/>
+          <p:cNvCxnSpPr>
+            <a:stCxn id="4" idx="2"/>
+            <a:endCxn id="6" idx="0"/>
+          </p:cNvCxnSpPr>
+          <p:nvPr/>
+        </p:nvCxnSpPr>
+        <p:spPr>
+          <a:xfrm rot="5400000">
+            <a:off x="3995819" y="447245"/>
+            <a:ext cx="663021" cy="3040769"/>
+          </a:xfrm>
+          <a:prstGeom prst="bentConnector3">
+            <a:avLst>
+              <a:gd name="adj1" fmla="val 50000"/>
+            </a:avLst>
+          </a:prstGeom>
+          <a:ln w="57150">
+            <a:solidFill>
+              <a:srgbClr val="321547"/>
+            </a:solidFill>
+            <a:tailEnd type="triangle"/>
+          </a:ln>
+        </p:spPr>
+        <p:style>
+          <a:lnRef idx="1">
+            <a:schemeClr val="accent1"/>
+          </a:lnRef>
+          <a:fillRef idx="0">
+            <a:schemeClr val="accent1"/>
+          </a:fillRef>
+          <a:effectRef idx="0">
+            <a:schemeClr val="accent1"/>
+          </a:effectRef>
+          <a:fontRef idx="minor">
+            <a:schemeClr val="tx1"/>
+          </a:fontRef>
+        </p:style>
+      </p:cxnSp>
+      <p:cxnSp>
+        <p:nvCxnSpPr>
+          <p:cNvPr id="13" name="Connecteur en angle 12"/>
+          <p:cNvCxnSpPr>
+            <a:stCxn id="4" idx="2"/>
+            <a:endCxn id="7" idx="0"/>
+          </p:cNvCxnSpPr>
+          <p:nvPr/>
+        </p:nvCxnSpPr>
+        <p:spPr>
+          <a:xfrm rot="16200000" flipH="1">
+            <a:off x="7246592" y="237239"/>
+            <a:ext cx="663021" cy="3460779"/>
+          </a:xfrm>
+          <a:prstGeom prst="bentConnector3">
+            <a:avLst>
+              <a:gd name="adj1" fmla="val 50000"/>
+            </a:avLst>
+          </a:prstGeom>
+          <a:ln w="57150">
+            <a:solidFill>
+              <a:srgbClr val="321547"/>
+            </a:solidFill>
+            <a:tailEnd type="triangle"/>
+          </a:ln>
+        </p:spPr>
+        <p:style>
+          <a:lnRef idx="1">
+            <a:schemeClr val="accent1"/>
+          </a:lnRef>
+          <a:fillRef idx="0">
+            <a:schemeClr val="accent1"/>
+          </a:fillRef>
+          <a:effectRef idx="0">
+            <a:schemeClr val="accent1"/>
+          </a:effectRef>
+          <a:fontRef idx="minor">
+            <a:schemeClr val="tx1"/>
+          </a:fontRef>
+        </p:style>
+      </p:cxnSp>
+      <p:sp>
+        <p:nvSpPr>
+          <p:cNvPr id="16" name="Rectangle 15"/>
+          <p:cNvSpPr/>
+          <p:nvPr/>
+        </p:nvSpPr>
+        <p:spPr>
+          <a:xfrm>
+            <a:off x="264328" y="3261933"/>
+            <a:ext cx="5085229" cy="887938"/>
           </a:xfrm>
           <a:prstGeom prst="rect">
             <a:avLst/>
@@ -9216,7 +9700,7 @@
                 <a:latin typeface="Calibri (Corps)"/>
                 <a:cs typeface="Segoe UI Light" panose="020B0502040204020203" pitchFamily="34" charset="0"/>
               </a:rPr>
-              <a:t>Periodically checks Heap for unused objects (objects without references)</a:t>
+              <a:t>Strings, Numbers, Booleans, null, undefined, Symbol</a:t>
             </a:r>
             <a:endParaRPr lang="en-US" sz="2000" dirty="0">
               <a:solidFill>
@@ -9230,14 +9714,14 @@
       </p:sp>
       <p:sp>
         <p:nvSpPr>
-          <p:cNvPr id="16" name="Rectangle 15"/>
+          <p:cNvPr id="17" name="Rectangle 16"/>
           <p:cNvSpPr/>
           <p:nvPr/>
         </p:nvSpPr>
         <p:spPr>
           <a:xfrm>
-            <a:off x="6906127" y="5425982"/>
-            <a:ext cx="4041882" cy="839255"/>
+            <a:off x="264327" y="4374832"/>
+            <a:ext cx="5085229" cy="887938"/>
           </a:xfrm>
           <a:prstGeom prst="rect">
             <a:avLst/>
@@ -9282,7 +9766,20 @@
                 <a:latin typeface="Calibri (Corps)"/>
                 <a:cs typeface="Segoe UI Light" panose="020B0502040204020203" pitchFamily="34" charset="0"/>
               </a:rPr>
-              <a:t>Removes unused objects</a:t>
+              <a:t>Stored in memory (normally on Stack),</a:t>
+            </a:r>
+          </a:p>
+          <a:p>
+            <a:pPr algn="ctr"/>
+            <a:r>
+              <a:rPr lang="en-US" sz="2000" dirty="0" smtClean="0">
+                <a:solidFill>
+                  <a:srgbClr val="660066"/>
+                </a:solidFill>
+                <a:latin typeface="Calibri (Corps)"/>
+                <a:cs typeface="Segoe UI Light" panose="020B0502040204020203" pitchFamily="34" charset="0"/>
+              </a:rPr>
+              <a:t>Variable stores value itself</a:t>
             </a:r>
             <a:endParaRPr lang="en-US" sz="2000" dirty="0">
               <a:solidFill>
@@ -9296,24 +9793,26 @@
       </p:sp>
       <p:sp>
         <p:nvSpPr>
-          <p:cNvPr id="17" name="Flèche droite 16"/>
+          <p:cNvPr id="18" name="Rectangle 17"/>
           <p:cNvSpPr/>
           <p:nvPr/>
         </p:nvSpPr>
         <p:spPr>
-          <a:xfrm rot="10800000">
-            <a:off x="5125434" y="3609231"/>
-            <a:ext cx="1601755" cy="733401"/>
-          </a:xfrm>
-          <a:prstGeom prst="rightArrow">
+          <a:xfrm>
+            <a:off x="264327" y="5481822"/>
+            <a:ext cx="5085229" cy="887938"/>
+          </a:xfrm>
+          <a:prstGeom prst="rect">
             <a:avLst/>
           </a:prstGeom>
           <a:solidFill>
-            <a:schemeClr val="accent2"/>
+            <a:srgbClr val="CC3399">
+              <a:alpha val="29020"/>
+            </a:srgbClr>
           </a:solidFill>
           <a:ln w="28575">
             <a:solidFill>
-              <a:schemeClr val="tx1"/>
+              <a:srgbClr val="660066"/>
             </a:solidFill>
           </a:ln>
         </p:spPr>
@@ -9338,9 +9837,29 @@
           <a:lstStyle/>
           <a:p>
             <a:pPr algn="ctr"/>
-            <a:endParaRPr lang="en-US" sz="2000" dirty="0">
+            <a:r>
+              <a:rPr lang="en-US" sz="2000" dirty="0" smtClean="0">
+                <a:solidFill>
+                  <a:srgbClr val="660066"/>
+                </a:solidFill>
+                <a:latin typeface="Calibri (Corps)"/>
+                <a:cs typeface="Segoe UI Light" panose="020B0502040204020203" pitchFamily="34" charset="0"/>
+              </a:rPr>
+              <a:t>Copying a variable (assign to different variable) </a:t>
+            </a:r>
+            <a:r>
+              <a:rPr lang="en-US" sz="2000" b="1" dirty="0" smtClean="0">
+                <a:solidFill>
+                  <a:srgbClr val="660066"/>
+                </a:solidFill>
+                <a:latin typeface="Calibri (Corps)"/>
+                <a:cs typeface="Segoe UI Light" panose="020B0502040204020203" pitchFamily="34" charset="0"/>
+              </a:rPr>
+              <a:t>copies the value</a:t>
+            </a:r>
+            <a:endParaRPr lang="en-US" sz="2000" b="1" dirty="0">
               <a:solidFill>
-                <a:sysClr val="windowText" lastClr="000000"/>
+                <a:srgbClr val="660066"/>
               </a:solidFill>
               <a:latin typeface="Calibri (Corps)"/>
               <a:cs typeface="Segoe UI Light" panose="020B0502040204020203" pitchFamily="34" charset="0"/>
@@ -9350,149 +9869,41 @@
       </p:sp>
       <p:sp>
         <p:nvSpPr>
-          <p:cNvPr id="18" name="Flèche droite 17"/>
+          <p:cNvPr id="19" name="Rectangle 18"/>
           <p:cNvSpPr/>
           <p:nvPr/>
         </p:nvSpPr>
         <p:spPr>
           <a:xfrm>
-            <a:off x="5125434" y="4504659"/>
-            <a:ext cx="1601755" cy="733401"/>
-          </a:xfrm>
-          <a:prstGeom prst="rightArrow">
-            <a:avLst/>
-          </a:prstGeom>
-          <a:solidFill>
-            <a:schemeClr val="accent2"/>
-          </a:solidFill>
-          <a:ln w="28575">
-            <a:solidFill>
-              <a:schemeClr val="tx1"/>
-            </a:solidFill>
-          </a:ln>
-        </p:spPr>
-        <p:style>
-          <a:lnRef idx="2">
-            <a:schemeClr val="accent1">
-              <a:shade val="50000"/>
-            </a:schemeClr>
-          </a:lnRef>
-          <a:fillRef idx="1">
-            <a:schemeClr val="accent1"/>
-          </a:fillRef>
-          <a:effectRef idx="0">
-            <a:schemeClr val="accent1"/>
-          </a:effectRef>
-          <a:fontRef idx="minor">
-            <a:schemeClr val="lt1"/>
-          </a:fontRef>
-        </p:style>
-        <p:txBody>
-          <a:bodyPr rtlCol="0" anchor="ctr"/>
-          <a:lstStyle/>
-          <a:p>
-            <a:pPr algn="ctr"/>
-            <a:endParaRPr lang="en-US" sz="2000" dirty="0">
-              <a:solidFill>
-                <a:sysClr val="windowText" lastClr="000000"/>
-              </a:solidFill>
-              <a:latin typeface="Calibri (Corps)"/>
-              <a:cs typeface="Segoe UI Light" panose="020B0502040204020203" pitchFamily="34" charset="0"/>
-            </a:endParaRPr>
-          </a:p>
-        </p:txBody>
-      </p:sp>
-      <p:sp>
-        <p:nvSpPr>
-          <p:cNvPr id="19" name="Flèche droite 18"/>
-          <p:cNvSpPr/>
-          <p:nvPr/>
-        </p:nvSpPr>
-        <p:spPr>
-          <a:xfrm rot="10800000">
-            <a:off x="5087110" y="5425982"/>
-            <a:ext cx="1601755" cy="733401"/>
-          </a:xfrm>
-          <a:prstGeom prst="rightArrow">
-            <a:avLst/>
-          </a:prstGeom>
-          <a:solidFill>
-            <a:schemeClr val="accent2"/>
-          </a:solidFill>
-          <a:ln w="28575">
-            <a:solidFill>
-              <a:schemeClr val="tx1"/>
-            </a:solidFill>
-          </a:ln>
-        </p:spPr>
-        <p:style>
-          <a:lnRef idx="2">
-            <a:schemeClr val="accent1">
-              <a:shade val="50000"/>
-            </a:schemeClr>
-          </a:lnRef>
-          <a:fillRef idx="1">
-            <a:schemeClr val="accent1"/>
-          </a:fillRef>
-          <a:effectRef idx="0">
-            <a:schemeClr val="accent1"/>
-          </a:effectRef>
-          <a:fontRef idx="minor">
-            <a:schemeClr val="lt1"/>
-          </a:fontRef>
-        </p:style>
-        <p:txBody>
-          <a:bodyPr rtlCol="0" anchor="ctr"/>
-          <a:lstStyle/>
-          <a:p>
-            <a:pPr algn="ctr"/>
-            <a:endParaRPr lang="en-US" sz="2000" dirty="0">
-              <a:solidFill>
-                <a:sysClr val="windowText" lastClr="000000"/>
-              </a:solidFill>
-              <a:latin typeface="Calibri (Corps)"/>
-              <a:cs typeface="Segoe UI Light" panose="020B0502040204020203" pitchFamily="34" charset="0"/>
-            </a:endParaRPr>
-          </a:p>
-        </p:txBody>
-      </p:sp>
-      <p:sp>
-        <p:nvSpPr>
-          <p:cNvPr id="20" name="Rectangle 19"/>
-          <p:cNvSpPr/>
-          <p:nvPr/>
-        </p:nvSpPr>
-        <p:spPr>
-          <a:xfrm>
-            <a:off x="8245157" y="1295894"/>
-            <a:ext cx="3638034" cy="1239390"/>
+            <a:off x="6765876" y="3261933"/>
+            <a:ext cx="5085229" cy="887938"/>
           </a:xfrm>
           <a:prstGeom prst="rect">
             <a:avLst/>
           </a:prstGeom>
           <a:solidFill>
-            <a:srgbClr val="FCF600"/>
+            <a:srgbClr val="ED7D31">
+              <a:alpha val="29020"/>
+            </a:srgbClr>
           </a:solidFill>
           <a:ln w="28575">
             <a:solidFill>
-              <a:schemeClr val="tx1"/>
+              <a:srgbClr val="ED7D31"/>
             </a:solidFill>
           </a:ln>
         </p:spPr>
         <p:style>
           <a:lnRef idx="2">
-            <a:schemeClr val="accent1">
-              <a:shade val="50000"/>
-            </a:schemeClr>
+            <a:schemeClr val="accent2"/>
           </a:lnRef>
           <a:fillRef idx="1">
-            <a:schemeClr val="accent1"/>
+            <a:schemeClr val="lt1"/>
           </a:fillRef>
           <a:effectRef idx="0">
-            <a:schemeClr val="accent1"/>
+            <a:schemeClr val="accent2"/>
           </a:effectRef>
           <a:fontRef idx="minor">
-            <a:schemeClr val="lt1"/>
+            <a:schemeClr val="dk1"/>
           </a:fontRef>
         </p:style>
         <p:txBody>
@@ -9503,32 +9914,143 @@
             <a:r>
               <a:rPr lang="en-US" sz="2000" dirty="0" smtClean="0">
                 <a:solidFill>
-                  <a:sysClr val="windowText" lastClr="000000"/>
+                  <a:schemeClr val="accent2"/>
                 </a:solidFill>
-                <a:latin typeface="Calibri (Corps)"/>
-                <a:cs typeface="Segoe UI Light" panose="020B0502040204020203" pitchFamily="34" charset="0"/>
               </a:rPr>
-              <a:t>Beware of “Memory Leaks”:</a:t>
-            </a:r>
-          </a:p>
+              <a:t>All other objects (“more expensive to create”)</a:t>
+            </a:r>
+            <a:endParaRPr lang="en-US" sz="2000" dirty="0">
+              <a:solidFill>
+                <a:schemeClr val="accent2"/>
+              </a:solidFill>
+            </a:endParaRPr>
+          </a:p>
+        </p:txBody>
+      </p:sp>
+      <p:sp>
+        <p:nvSpPr>
+          <p:cNvPr id="20" name="Rectangle 19"/>
+          <p:cNvSpPr/>
+          <p:nvPr/>
+        </p:nvSpPr>
+        <p:spPr>
+          <a:xfrm>
+            <a:off x="6765876" y="4374832"/>
+            <a:ext cx="5085229" cy="887938"/>
+          </a:xfrm>
+          <a:prstGeom prst="rect">
+            <a:avLst/>
+          </a:prstGeom>
+          <a:solidFill>
+            <a:srgbClr val="ED7D31">
+              <a:alpha val="29020"/>
+            </a:srgbClr>
+          </a:solidFill>
+          <a:ln w="28575">
+            <a:solidFill>
+              <a:srgbClr val="ED7D31"/>
+            </a:solidFill>
+          </a:ln>
+        </p:spPr>
+        <p:style>
+          <a:lnRef idx="2">
+            <a:schemeClr val="accent2"/>
+          </a:lnRef>
+          <a:fillRef idx="1">
+            <a:schemeClr val="lt1"/>
+          </a:fillRef>
+          <a:effectRef idx="0">
+            <a:schemeClr val="accent2"/>
+          </a:effectRef>
+          <a:fontRef idx="minor">
+            <a:schemeClr val="dk1"/>
+          </a:fontRef>
+        </p:style>
+        <p:txBody>
+          <a:bodyPr rtlCol="0" anchor="ctr"/>
+          <a:lstStyle/>
           <a:p>
             <a:pPr algn="ctr"/>
             <a:r>
               <a:rPr lang="en-US" sz="2000" dirty="0" smtClean="0">
                 <a:solidFill>
-                  <a:sysClr val="windowText" lastClr="000000"/>
+                  <a:schemeClr val="accent2"/>
                 </a:solidFill>
-                <a:latin typeface="Calibri (Corps)"/>
-                <a:cs typeface="Segoe UI Light" panose="020B0502040204020203" pitchFamily="34" charset="0"/>
               </a:rPr>
-              <a:t>Unused objects, where you still hold references to</a:t>
+              <a:t>Stored in memory (Heap), variable stores a pointer (address) to location in memory</a:t>
             </a:r>
             <a:endParaRPr lang="en-US" sz="2000" dirty="0">
               <a:solidFill>
-                <a:sysClr val="windowText" lastClr="000000"/>
+                <a:schemeClr val="accent2"/>
               </a:solidFill>
-              <a:latin typeface="Calibri (Corps)"/>
-              <a:cs typeface="Segoe UI Light" panose="020B0502040204020203" pitchFamily="34" charset="0"/>
+            </a:endParaRPr>
+          </a:p>
+        </p:txBody>
+      </p:sp>
+      <p:sp>
+        <p:nvSpPr>
+          <p:cNvPr id="21" name="Rectangle 20"/>
+          <p:cNvSpPr/>
+          <p:nvPr/>
+        </p:nvSpPr>
+        <p:spPr>
+          <a:xfrm>
+            <a:off x="6765876" y="5481822"/>
+            <a:ext cx="5085229" cy="887938"/>
+          </a:xfrm>
+          <a:prstGeom prst="rect">
+            <a:avLst/>
+          </a:prstGeom>
+          <a:solidFill>
+            <a:srgbClr val="ED7D31">
+              <a:alpha val="29020"/>
+            </a:srgbClr>
+          </a:solidFill>
+          <a:ln w="28575">
+            <a:solidFill>
+              <a:srgbClr val="ED7D31"/>
+            </a:solidFill>
+          </a:ln>
+        </p:spPr>
+        <p:style>
+          <a:lnRef idx="2">
+            <a:schemeClr val="accent2"/>
+          </a:lnRef>
+          <a:fillRef idx="1">
+            <a:schemeClr val="lt1"/>
+          </a:fillRef>
+          <a:effectRef idx="0">
+            <a:schemeClr val="accent2"/>
+          </a:effectRef>
+          <a:fontRef idx="minor">
+            <a:schemeClr val="dk1"/>
+          </a:fontRef>
+        </p:style>
+        <p:txBody>
+          <a:bodyPr rtlCol="0" anchor="ctr"/>
+          <a:lstStyle/>
+          <a:p>
+            <a:pPr algn="ctr"/>
+            <a:r>
+              <a:rPr lang="en-US" sz="2000" dirty="0" smtClean="0">
+                <a:solidFill>
+                  <a:schemeClr val="accent2"/>
+                </a:solidFill>
+              </a:rPr>
+              <a:t>Copying a variable (assign to different variable) </a:t>
+            </a:r>
+            <a:r>
+              <a:rPr lang="en-US" sz="2000" b="1" dirty="0" smtClean="0">
+                <a:solidFill>
+                  <a:schemeClr val="accent2"/>
+                </a:solidFill>
+              </a:rPr>
+              <a:t>copies the pointer/reference</a:t>
+            </a:r>
+            <a:endParaRPr lang="en-US" sz="2000" b="1" dirty="0">
+              <a:solidFill>
+                <a:schemeClr val="accent2"/>
+              </a:solidFill>
             </a:endParaRPr>
           </a:p>
         </p:txBody>
@@ -9536,7 +10058,7 @@
     </p:spTree>
     <p:extLst>
       <p:ext uri="{BB962C8B-B14F-4D97-AF65-F5344CB8AC3E}">
-        <p14:creationId xmlns:p14="http://schemas.microsoft.com/office/powerpoint/2010/main" val="1522621142"/>
+        <p14:creationId xmlns:p14="http://schemas.microsoft.com/office/powerpoint/2010/main" val="911258773"/>
       </p:ext>
     </p:extLst>
   </p:cSld>

</xml_diff>